<commit_message>
alter some classes and add insert functions for sql
</commit_message>
<xml_diff>
--- a/design/E-R Diagram.pptx
+++ b/design/E-R Diagram.pptx
@@ -243,7 +243,7 @@
           <a:p>
             <a:fld id="{E766C5E8-0AAF-4497-91D2-AC309810ED9A}" type="datetimeFigureOut">
               <a:rPr lang="zh-CN" altLang="en-US" smtClean="0"/>
-              <a:t>2018/5/22</a:t>
+              <a:t>2018/5/23</a:t>
             </a:fld>
             <a:endParaRPr lang="zh-CN" altLang="en-US"/>
           </a:p>
@@ -413,7 +413,7 @@
           <a:p>
             <a:fld id="{E766C5E8-0AAF-4497-91D2-AC309810ED9A}" type="datetimeFigureOut">
               <a:rPr lang="zh-CN" altLang="en-US" smtClean="0"/>
-              <a:t>2018/5/22</a:t>
+              <a:t>2018/5/23</a:t>
             </a:fld>
             <a:endParaRPr lang="zh-CN" altLang="en-US"/>
           </a:p>
@@ -593,7 +593,7 @@
           <a:p>
             <a:fld id="{E766C5E8-0AAF-4497-91D2-AC309810ED9A}" type="datetimeFigureOut">
               <a:rPr lang="zh-CN" altLang="en-US" smtClean="0"/>
-              <a:t>2018/5/22</a:t>
+              <a:t>2018/5/23</a:t>
             </a:fld>
             <a:endParaRPr lang="zh-CN" altLang="en-US"/>
           </a:p>
@@ -763,7 +763,7 @@
           <a:p>
             <a:fld id="{E766C5E8-0AAF-4497-91D2-AC309810ED9A}" type="datetimeFigureOut">
               <a:rPr lang="zh-CN" altLang="en-US" smtClean="0"/>
-              <a:t>2018/5/22</a:t>
+              <a:t>2018/5/23</a:t>
             </a:fld>
             <a:endParaRPr lang="zh-CN" altLang="en-US"/>
           </a:p>
@@ -1009,7 +1009,7 @@
           <a:p>
             <a:fld id="{E766C5E8-0AAF-4497-91D2-AC309810ED9A}" type="datetimeFigureOut">
               <a:rPr lang="zh-CN" altLang="en-US" smtClean="0"/>
-              <a:t>2018/5/22</a:t>
+              <a:t>2018/5/23</a:t>
             </a:fld>
             <a:endParaRPr lang="zh-CN" altLang="en-US"/>
           </a:p>
@@ -1241,7 +1241,7 @@
           <a:p>
             <a:fld id="{E766C5E8-0AAF-4497-91D2-AC309810ED9A}" type="datetimeFigureOut">
               <a:rPr lang="zh-CN" altLang="en-US" smtClean="0"/>
-              <a:t>2018/5/22</a:t>
+              <a:t>2018/5/23</a:t>
             </a:fld>
             <a:endParaRPr lang="zh-CN" altLang="en-US"/>
           </a:p>
@@ -1608,7 +1608,7 @@
           <a:p>
             <a:fld id="{E766C5E8-0AAF-4497-91D2-AC309810ED9A}" type="datetimeFigureOut">
               <a:rPr lang="zh-CN" altLang="en-US" smtClean="0"/>
-              <a:t>2018/5/22</a:t>
+              <a:t>2018/5/23</a:t>
             </a:fld>
             <a:endParaRPr lang="zh-CN" altLang="en-US"/>
           </a:p>
@@ -1726,7 +1726,7 @@
           <a:p>
             <a:fld id="{E766C5E8-0AAF-4497-91D2-AC309810ED9A}" type="datetimeFigureOut">
               <a:rPr lang="zh-CN" altLang="en-US" smtClean="0"/>
-              <a:t>2018/5/22</a:t>
+              <a:t>2018/5/23</a:t>
             </a:fld>
             <a:endParaRPr lang="zh-CN" altLang="en-US"/>
           </a:p>
@@ -1821,7 +1821,7 @@
           <a:p>
             <a:fld id="{E766C5E8-0AAF-4497-91D2-AC309810ED9A}" type="datetimeFigureOut">
               <a:rPr lang="zh-CN" altLang="en-US" smtClean="0"/>
-              <a:t>2018/5/22</a:t>
+              <a:t>2018/5/23</a:t>
             </a:fld>
             <a:endParaRPr lang="zh-CN" altLang="en-US"/>
           </a:p>
@@ -2098,7 +2098,7 @@
           <a:p>
             <a:fld id="{E766C5E8-0AAF-4497-91D2-AC309810ED9A}" type="datetimeFigureOut">
               <a:rPr lang="zh-CN" altLang="en-US" smtClean="0"/>
-              <a:t>2018/5/22</a:t>
+              <a:t>2018/5/23</a:t>
             </a:fld>
             <a:endParaRPr lang="zh-CN" altLang="en-US"/>
           </a:p>
@@ -2351,7 +2351,7 @@
           <a:p>
             <a:fld id="{E766C5E8-0AAF-4497-91D2-AC309810ED9A}" type="datetimeFigureOut">
               <a:rPr lang="zh-CN" altLang="en-US" smtClean="0"/>
-              <a:t>2018/5/22</a:t>
+              <a:t>2018/5/23</a:t>
             </a:fld>
             <a:endParaRPr lang="zh-CN" altLang="en-US"/>
           </a:p>
@@ -2564,7 +2564,7 @@
           <a:p>
             <a:fld id="{E766C5E8-0AAF-4497-91D2-AC309810ED9A}" type="datetimeFigureOut">
               <a:rPr lang="zh-CN" altLang="en-US" smtClean="0"/>
-              <a:t>2018/5/22</a:t>
+              <a:t>2018/5/23</a:t>
             </a:fld>
             <a:endParaRPr lang="zh-CN" altLang="en-US"/>
           </a:p>
@@ -3065,7 +3065,7 @@
               <a:pPr algn="ctr"/>
               <a:r>
                 <a:rPr lang="en-US" altLang="zh-CN" dirty="0" smtClean="0"/>
-                <a:t>ID</a:t>
+                <a:t>userID</a:t>
               </a:r>
               <a:endParaRPr lang="zh-CN" altLang="en-US" dirty="0"/>
             </a:p>
@@ -3334,1048 +3334,6 @@
       </p:grpSp>
       <p:grpSp>
         <p:nvGrpSpPr>
-          <p:cNvPr id="61" name="组合 60"/>
-          <p:cNvGrpSpPr/>
-          <p:nvPr/>
-        </p:nvGrpSpPr>
-        <p:grpSpPr>
-          <a:xfrm>
-            <a:off x="189144" y="3701143"/>
-            <a:ext cx="7361525" cy="2624972"/>
-            <a:chOff x="217935" y="2970712"/>
-            <a:chExt cx="6914631" cy="3212607"/>
-          </a:xfrm>
-        </p:grpSpPr>
-        <p:sp>
-          <p:nvSpPr>
-            <p:cNvPr id="10" name="圆角矩形 9"/>
-            <p:cNvSpPr/>
-            <p:nvPr/>
-          </p:nvSpPr>
-          <p:spPr>
-            <a:xfrm>
-              <a:off x="3074813" y="4165959"/>
-              <a:ext cx="1219200" cy="513805"/>
-            </a:xfrm>
-            <a:prstGeom prst="roundRect">
-              <a:avLst/>
-            </a:prstGeom>
-          </p:spPr>
-          <p:style>
-            <a:lnRef idx="2">
-              <a:schemeClr val="accent1">
-                <a:shade val="50000"/>
-              </a:schemeClr>
-            </a:lnRef>
-            <a:fillRef idx="1">
-              <a:schemeClr val="accent1"/>
-            </a:fillRef>
-            <a:effectRef idx="0">
-              <a:schemeClr val="accent1"/>
-            </a:effectRef>
-            <a:fontRef idx="minor">
-              <a:schemeClr val="lt1"/>
-            </a:fontRef>
-          </p:style>
-          <p:txBody>
-            <a:bodyPr rtlCol="0" anchor="ctr"/>
-            <a:lstStyle/>
-            <a:p>
-              <a:pPr algn="ctr"/>
-              <a:r>
-                <a:rPr lang="en-US" altLang="zh-CN" dirty="0" smtClean="0"/>
-                <a:t>Recipe</a:t>
-              </a:r>
-              <a:endParaRPr lang="zh-CN" altLang="en-US" dirty="0"/>
-            </a:p>
-          </p:txBody>
-        </p:sp>
-        <p:sp>
-          <p:nvSpPr>
-            <p:cNvPr id="25" name="椭圆 24"/>
-            <p:cNvSpPr/>
-            <p:nvPr/>
-          </p:nvSpPr>
-          <p:spPr>
-            <a:xfrm>
-              <a:off x="472865" y="4380139"/>
-              <a:ext cx="1288869" cy="383177"/>
-            </a:xfrm>
-            <a:prstGeom prst="ellipse">
-              <a:avLst/>
-            </a:prstGeom>
-          </p:spPr>
-          <p:style>
-            <a:lnRef idx="2">
-              <a:schemeClr val="accent1">
-                <a:shade val="50000"/>
-              </a:schemeClr>
-            </a:lnRef>
-            <a:fillRef idx="1">
-              <a:schemeClr val="accent1"/>
-            </a:fillRef>
-            <a:effectRef idx="0">
-              <a:schemeClr val="accent1"/>
-            </a:effectRef>
-            <a:fontRef idx="minor">
-              <a:schemeClr val="lt1"/>
-            </a:fontRef>
-          </p:style>
-          <p:txBody>
-            <a:bodyPr rtlCol="0" anchor="ctr"/>
-            <a:lstStyle/>
-            <a:p>
-              <a:pPr algn="ctr"/>
-              <a:r>
-                <a:rPr lang="en-US" altLang="zh-CN" dirty="0" smtClean="0"/>
-                <a:t>ID</a:t>
-              </a:r>
-              <a:endParaRPr lang="zh-CN" altLang="en-US" dirty="0"/>
-            </a:p>
-          </p:txBody>
-        </p:sp>
-        <p:sp>
-          <p:nvSpPr>
-            <p:cNvPr id="26" name="椭圆 25"/>
-            <p:cNvSpPr/>
-            <p:nvPr/>
-          </p:nvSpPr>
-          <p:spPr>
-            <a:xfrm>
-              <a:off x="217935" y="5050540"/>
-              <a:ext cx="1942011" cy="383177"/>
-            </a:xfrm>
-            <a:prstGeom prst="ellipse">
-              <a:avLst/>
-            </a:prstGeom>
-          </p:spPr>
-          <p:style>
-            <a:lnRef idx="2">
-              <a:schemeClr val="accent1">
-                <a:shade val="50000"/>
-              </a:schemeClr>
-            </a:lnRef>
-            <a:fillRef idx="1">
-              <a:schemeClr val="accent1"/>
-            </a:fillRef>
-            <a:effectRef idx="0">
-              <a:schemeClr val="accent1"/>
-            </a:effectRef>
-            <a:fontRef idx="minor">
-              <a:schemeClr val="lt1"/>
-            </a:fontRef>
-          </p:style>
-          <p:txBody>
-            <a:bodyPr rtlCol="0" anchor="ctr"/>
-            <a:lstStyle/>
-            <a:p>
-              <a:pPr algn="ctr"/>
-              <a:r>
-                <a:rPr lang="en-US" altLang="zh-CN" dirty="0" smtClean="0"/>
-                <a:t>recipeName</a:t>
-              </a:r>
-              <a:endParaRPr lang="zh-CN" altLang="en-US" dirty="0"/>
-            </a:p>
-          </p:txBody>
-        </p:sp>
-        <p:sp>
-          <p:nvSpPr>
-            <p:cNvPr id="27" name="椭圆 26"/>
-            <p:cNvSpPr/>
-            <p:nvPr/>
-          </p:nvSpPr>
-          <p:spPr>
-            <a:xfrm>
-              <a:off x="514088" y="5768550"/>
-              <a:ext cx="1942011" cy="383177"/>
-            </a:xfrm>
-            <a:prstGeom prst="ellipse">
-              <a:avLst/>
-            </a:prstGeom>
-          </p:spPr>
-          <p:style>
-            <a:lnRef idx="2">
-              <a:schemeClr val="accent1">
-                <a:shade val="50000"/>
-              </a:schemeClr>
-            </a:lnRef>
-            <a:fillRef idx="1">
-              <a:schemeClr val="accent1"/>
-            </a:fillRef>
-            <a:effectRef idx="0">
-              <a:schemeClr val="accent1"/>
-            </a:effectRef>
-            <a:fontRef idx="minor">
-              <a:schemeClr val="lt1"/>
-            </a:fontRef>
-          </p:style>
-          <p:txBody>
-            <a:bodyPr rtlCol="0" anchor="ctr"/>
-            <a:lstStyle/>
-            <a:p>
-              <a:pPr algn="ctr"/>
-              <a:r>
-                <a:rPr lang="en-US" altLang="zh-CN" dirty="0" smtClean="0"/>
-                <a:t>Description</a:t>
-              </a:r>
-              <a:endParaRPr lang="zh-CN" altLang="en-US" dirty="0"/>
-            </a:p>
-          </p:txBody>
-        </p:sp>
-        <p:sp>
-          <p:nvSpPr>
-            <p:cNvPr id="28" name="椭圆 27"/>
-            <p:cNvSpPr/>
-            <p:nvPr/>
-          </p:nvSpPr>
-          <p:spPr>
-            <a:xfrm>
-              <a:off x="4854393" y="5800142"/>
-              <a:ext cx="1942011" cy="383177"/>
-            </a:xfrm>
-            <a:prstGeom prst="ellipse">
-              <a:avLst/>
-            </a:prstGeom>
-          </p:spPr>
-          <p:style>
-            <a:lnRef idx="2">
-              <a:schemeClr val="accent1">
-                <a:shade val="50000"/>
-              </a:schemeClr>
-            </a:lnRef>
-            <a:fillRef idx="1">
-              <a:schemeClr val="accent1"/>
-            </a:fillRef>
-            <a:effectRef idx="0">
-              <a:schemeClr val="accent1"/>
-            </a:effectRef>
-            <a:fontRef idx="minor">
-              <a:schemeClr val="lt1"/>
-            </a:fontRef>
-          </p:style>
-          <p:txBody>
-            <a:bodyPr rtlCol="0" anchor="ctr"/>
-            <a:lstStyle/>
-            <a:p>
-              <a:pPr algn="ctr"/>
-              <a:r>
-                <a:rPr lang="en-US" altLang="zh-CN" dirty="0" smtClean="0"/>
-                <a:t>Preparation</a:t>
-              </a:r>
-              <a:endParaRPr lang="zh-CN" altLang="en-US" dirty="0"/>
-            </a:p>
-          </p:txBody>
-        </p:sp>
-        <p:sp>
-          <p:nvSpPr>
-            <p:cNvPr id="29" name="椭圆 28"/>
-            <p:cNvSpPr/>
-            <p:nvPr/>
-          </p:nvSpPr>
-          <p:spPr>
-            <a:xfrm>
-              <a:off x="326570" y="3739242"/>
-              <a:ext cx="1942011" cy="383177"/>
-            </a:xfrm>
-            <a:prstGeom prst="ellipse">
-              <a:avLst/>
-            </a:prstGeom>
-          </p:spPr>
-          <p:style>
-            <a:lnRef idx="2">
-              <a:schemeClr val="accent1">
-                <a:shade val="50000"/>
-              </a:schemeClr>
-            </a:lnRef>
-            <a:fillRef idx="1">
-              <a:schemeClr val="accent1"/>
-            </a:fillRef>
-            <a:effectRef idx="0">
-              <a:schemeClr val="accent1"/>
-            </a:effectRef>
-            <a:fontRef idx="minor">
-              <a:schemeClr val="lt1"/>
-            </a:fontRef>
-          </p:style>
-          <p:txBody>
-            <a:bodyPr rtlCol="0" anchor="ctr"/>
-            <a:lstStyle/>
-            <a:p>
-              <a:pPr algn="ctr"/>
-              <a:r>
-                <a:rPr lang="en-US" altLang="zh-CN" dirty="0" smtClean="0"/>
-                <a:t>cookingTime</a:t>
-              </a:r>
-              <a:endParaRPr lang="zh-CN" altLang="en-US" dirty="0"/>
-            </a:p>
-          </p:txBody>
-        </p:sp>
-        <p:sp>
-          <p:nvSpPr>
-            <p:cNvPr id="30" name="椭圆 29"/>
-            <p:cNvSpPr/>
-            <p:nvPr/>
-          </p:nvSpPr>
-          <p:spPr>
-            <a:xfrm>
-              <a:off x="326569" y="2970712"/>
-              <a:ext cx="1942011" cy="383177"/>
-            </a:xfrm>
-            <a:prstGeom prst="ellipse">
-              <a:avLst/>
-            </a:prstGeom>
-          </p:spPr>
-          <p:style>
-            <a:lnRef idx="2">
-              <a:schemeClr val="accent1">
-                <a:shade val="50000"/>
-              </a:schemeClr>
-            </a:lnRef>
-            <a:fillRef idx="1">
-              <a:schemeClr val="accent1"/>
-            </a:fillRef>
-            <a:effectRef idx="0">
-              <a:schemeClr val="accent1"/>
-            </a:effectRef>
-            <a:fontRef idx="minor">
-              <a:schemeClr val="lt1"/>
-            </a:fontRef>
-          </p:style>
-          <p:txBody>
-            <a:bodyPr rtlCol="0" anchor="ctr"/>
-            <a:lstStyle/>
-            <a:p>
-              <a:pPr algn="ctr"/>
-              <a:r>
-                <a:rPr lang="en-US" altLang="zh-CN" dirty="0" smtClean="0"/>
-                <a:t>ImagePath</a:t>
-              </a:r>
-              <a:endParaRPr lang="zh-CN" altLang="en-US" dirty="0"/>
-            </a:p>
-          </p:txBody>
-        </p:sp>
-        <p:sp>
-          <p:nvSpPr>
-            <p:cNvPr id="32" name="椭圆 31"/>
-            <p:cNvSpPr/>
-            <p:nvPr/>
-          </p:nvSpPr>
-          <p:spPr>
-            <a:xfrm>
-              <a:off x="5190555" y="5021035"/>
-              <a:ext cx="1942011" cy="383177"/>
-            </a:xfrm>
-            <a:prstGeom prst="ellipse">
-              <a:avLst/>
-            </a:prstGeom>
-          </p:spPr>
-          <p:style>
-            <a:lnRef idx="2">
-              <a:schemeClr val="accent1">
-                <a:shade val="50000"/>
-              </a:schemeClr>
-            </a:lnRef>
-            <a:fillRef idx="1">
-              <a:schemeClr val="accent1"/>
-            </a:fillRef>
-            <a:effectRef idx="0">
-              <a:schemeClr val="accent1"/>
-            </a:effectRef>
-            <a:fontRef idx="minor">
-              <a:schemeClr val="lt1"/>
-            </a:fontRef>
-          </p:style>
-          <p:txBody>
-            <a:bodyPr rtlCol="0" anchor="ctr"/>
-            <a:lstStyle/>
-            <a:p>
-              <a:pPr algn="ctr"/>
-              <a:r>
-                <a:rPr lang="en-US" altLang="zh-CN" dirty="0" smtClean="0"/>
-                <a:t>Status</a:t>
-              </a:r>
-              <a:endParaRPr lang="zh-CN" altLang="en-US" dirty="0"/>
-            </a:p>
-          </p:txBody>
-        </p:sp>
-        <p:cxnSp>
-          <p:nvCxnSpPr>
-            <p:cNvPr id="34" name="直接连接符 33"/>
-            <p:cNvCxnSpPr>
-              <a:stCxn id="30" idx="5"/>
-              <a:endCxn id="10" idx="1"/>
-            </p:cNvCxnSpPr>
-            <p:nvPr/>
-          </p:nvCxnSpPr>
-          <p:spPr>
-            <a:xfrm>
-              <a:off x="1984179" y="3297774"/>
-              <a:ext cx="1090634" cy="1125088"/>
-            </a:xfrm>
-            <a:prstGeom prst="line">
-              <a:avLst/>
-            </a:prstGeom>
-          </p:spPr>
-          <p:style>
-            <a:lnRef idx="1">
-              <a:schemeClr val="accent1"/>
-            </a:lnRef>
-            <a:fillRef idx="0">
-              <a:schemeClr val="accent1"/>
-            </a:fillRef>
-            <a:effectRef idx="0">
-              <a:schemeClr val="accent1"/>
-            </a:effectRef>
-            <a:fontRef idx="minor">
-              <a:schemeClr val="tx1"/>
-            </a:fontRef>
-          </p:style>
-        </p:cxnSp>
-        <p:cxnSp>
-          <p:nvCxnSpPr>
-            <p:cNvPr id="36" name="直接连接符 35"/>
-            <p:cNvCxnSpPr>
-              <a:stCxn id="32" idx="0"/>
-              <a:endCxn id="10" idx="3"/>
-            </p:cNvCxnSpPr>
-            <p:nvPr/>
-          </p:nvCxnSpPr>
-          <p:spPr>
-            <a:xfrm flipH="1" flipV="1">
-              <a:off x="4294013" y="4422861"/>
-              <a:ext cx="1867547" cy="598174"/>
-            </a:xfrm>
-            <a:prstGeom prst="line">
-              <a:avLst/>
-            </a:prstGeom>
-          </p:spPr>
-          <p:style>
-            <a:lnRef idx="1">
-              <a:schemeClr val="accent1"/>
-            </a:lnRef>
-            <a:fillRef idx="0">
-              <a:schemeClr val="accent1"/>
-            </a:fillRef>
-            <a:effectRef idx="0">
-              <a:schemeClr val="accent1"/>
-            </a:effectRef>
-            <a:fontRef idx="minor">
-              <a:schemeClr val="tx1"/>
-            </a:fontRef>
-          </p:style>
-        </p:cxnSp>
-        <p:cxnSp>
-          <p:nvCxnSpPr>
-            <p:cNvPr id="38" name="直接连接符 37"/>
-            <p:cNvCxnSpPr>
-              <a:stCxn id="29" idx="4"/>
-              <a:endCxn id="10" idx="1"/>
-            </p:cNvCxnSpPr>
-            <p:nvPr/>
-          </p:nvCxnSpPr>
-          <p:spPr>
-            <a:xfrm>
-              <a:off x="1297576" y="4122419"/>
-              <a:ext cx="1777238" cy="300443"/>
-            </a:xfrm>
-            <a:prstGeom prst="line">
-              <a:avLst/>
-            </a:prstGeom>
-          </p:spPr>
-          <p:style>
-            <a:lnRef idx="1">
-              <a:schemeClr val="accent1"/>
-            </a:lnRef>
-            <a:fillRef idx="0">
-              <a:schemeClr val="accent1"/>
-            </a:fillRef>
-            <a:effectRef idx="0">
-              <a:schemeClr val="accent1"/>
-            </a:effectRef>
-            <a:fontRef idx="minor">
-              <a:schemeClr val="tx1"/>
-            </a:fontRef>
-          </p:style>
-        </p:cxnSp>
-        <p:cxnSp>
-          <p:nvCxnSpPr>
-            <p:cNvPr id="40" name="直接连接符 39"/>
-            <p:cNvCxnSpPr>
-              <a:stCxn id="25" idx="6"/>
-              <a:endCxn id="10" idx="1"/>
-            </p:cNvCxnSpPr>
-            <p:nvPr/>
-          </p:nvCxnSpPr>
-          <p:spPr>
-            <a:xfrm flipV="1">
-              <a:off x="1761734" y="4422861"/>
-              <a:ext cx="1313079" cy="148866"/>
-            </a:xfrm>
-            <a:prstGeom prst="line">
-              <a:avLst/>
-            </a:prstGeom>
-          </p:spPr>
-          <p:style>
-            <a:lnRef idx="1">
-              <a:schemeClr val="accent1"/>
-            </a:lnRef>
-            <a:fillRef idx="0">
-              <a:schemeClr val="accent1"/>
-            </a:fillRef>
-            <a:effectRef idx="0">
-              <a:schemeClr val="accent1"/>
-            </a:effectRef>
-            <a:fontRef idx="minor">
-              <a:schemeClr val="tx1"/>
-            </a:fontRef>
-          </p:style>
-        </p:cxnSp>
-        <p:cxnSp>
-          <p:nvCxnSpPr>
-            <p:cNvPr id="42" name="直接连接符 41"/>
-            <p:cNvCxnSpPr>
-              <a:stCxn id="26" idx="7"/>
-              <a:endCxn id="10" idx="2"/>
-            </p:cNvCxnSpPr>
-            <p:nvPr/>
-          </p:nvCxnSpPr>
-          <p:spPr>
-            <a:xfrm flipV="1">
-              <a:off x="1875545" y="4679764"/>
-              <a:ext cx="1808868" cy="426892"/>
-            </a:xfrm>
-            <a:prstGeom prst="line">
-              <a:avLst/>
-            </a:prstGeom>
-          </p:spPr>
-          <p:style>
-            <a:lnRef idx="1">
-              <a:schemeClr val="accent1"/>
-            </a:lnRef>
-            <a:fillRef idx="0">
-              <a:schemeClr val="accent1"/>
-            </a:fillRef>
-            <a:effectRef idx="0">
-              <a:schemeClr val="accent1"/>
-            </a:effectRef>
-            <a:fontRef idx="minor">
-              <a:schemeClr val="tx1"/>
-            </a:fontRef>
-          </p:style>
-        </p:cxnSp>
-        <p:cxnSp>
-          <p:nvCxnSpPr>
-            <p:cNvPr id="44" name="直接连接符 43"/>
-            <p:cNvCxnSpPr>
-              <a:stCxn id="27" idx="0"/>
-              <a:endCxn id="10" idx="2"/>
-            </p:cNvCxnSpPr>
-            <p:nvPr/>
-          </p:nvCxnSpPr>
-          <p:spPr>
-            <a:xfrm flipV="1">
-              <a:off x="1485093" y="4679764"/>
-              <a:ext cx="2199320" cy="1088787"/>
-            </a:xfrm>
-            <a:prstGeom prst="line">
-              <a:avLst/>
-            </a:prstGeom>
-          </p:spPr>
-          <p:style>
-            <a:lnRef idx="1">
-              <a:schemeClr val="accent1"/>
-            </a:lnRef>
-            <a:fillRef idx="0">
-              <a:schemeClr val="accent1"/>
-            </a:fillRef>
-            <a:effectRef idx="0">
-              <a:schemeClr val="accent1"/>
-            </a:effectRef>
-            <a:fontRef idx="minor">
-              <a:schemeClr val="tx1"/>
-            </a:fontRef>
-          </p:style>
-        </p:cxnSp>
-        <p:cxnSp>
-          <p:nvCxnSpPr>
-            <p:cNvPr id="46" name="直接连接符 45"/>
-            <p:cNvCxnSpPr>
-              <a:stCxn id="28" idx="0"/>
-              <a:endCxn id="10" idx="2"/>
-            </p:cNvCxnSpPr>
-            <p:nvPr/>
-          </p:nvCxnSpPr>
-          <p:spPr>
-            <a:xfrm flipH="1" flipV="1">
-              <a:off x="3684414" y="4679764"/>
-              <a:ext cx="2140985" cy="1120378"/>
-            </a:xfrm>
-            <a:prstGeom prst="line">
-              <a:avLst/>
-            </a:prstGeom>
-          </p:spPr>
-          <p:style>
-            <a:lnRef idx="1">
-              <a:schemeClr val="accent1"/>
-            </a:lnRef>
-            <a:fillRef idx="0">
-              <a:schemeClr val="accent1"/>
-            </a:fillRef>
-            <a:effectRef idx="0">
-              <a:schemeClr val="accent1"/>
-            </a:effectRef>
-            <a:fontRef idx="minor">
-              <a:schemeClr val="tx1"/>
-            </a:fontRef>
-          </p:style>
-        </p:cxnSp>
-      </p:grpSp>
-      <p:grpSp>
-        <p:nvGrpSpPr>
-          <p:cNvPr id="84" name="组合 83"/>
-          <p:cNvGrpSpPr/>
-          <p:nvPr/>
-        </p:nvGrpSpPr>
-        <p:grpSpPr>
-          <a:xfrm>
-            <a:off x="0" y="191589"/>
-            <a:ext cx="5294811" cy="1380027"/>
-            <a:chOff x="291738" y="191589"/>
-            <a:chExt cx="5353594" cy="1942011"/>
-          </a:xfrm>
-        </p:grpSpPr>
-        <p:sp>
-          <p:nvSpPr>
-            <p:cNvPr id="11" name="圆角矩形 10"/>
-            <p:cNvSpPr/>
-            <p:nvPr/>
-          </p:nvSpPr>
-          <p:spPr>
-            <a:xfrm>
-              <a:off x="2281647" y="1269272"/>
-              <a:ext cx="1219200" cy="513805"/>
-            </a:xfrm>
-            <a:prstGeom prst="roundRect">
-              <a:avLst/>
-            </a:prstGeom>
-          </p:spPr>
-          <p:style>
-            <a:lnRef idx="2">
-              <a:schemeClr val="accent1">
-                <a:shade val="50000"/>
-              </a:schemeClr>
-            </a:lnRef>
-            <a:fillRef idx="1">
-              <a:schemeClr val="accent1"/>
-            </a:fillRef>
-            <a:effectRef idx="0">
-              <a:schemeClr val="accent1"/>
-            </a:effectRef>
-            <a:fontRef idx="minor">
-              <a:schemeClr val="lt1"/>
-            </a:fontRef>
-          </p:style>
-          <p:txBody>
-            <a:bodyPr rtlCol="0" anchor="ctr"/>
-            <a:lstStyle/>
-            <a:p>
-              <a:pPr algn="ctr"/>
-              <a:r>
-                <a:rPr lang="en-US" altLang="zh-CN" dirty="0" smtClean="0"/>
-                <a:t>Ingredient</a:t>
-              </a:r>
-              <a:endParaRPr lang="zh-CN" altLang="en-US" dirty="0"/>
-            </a:p>
-          </p:txBody>
-        </p:sp>
-        <p:sp>
-          <p:nvSpPr>
-            <p:cNvPr id="63" name="椭圆 62"/>
-            <p:cNvSpPr/>
-            <p:nvPr/>
-          </p:nvSpPr>
-          <p:spPr>
-            <a:xfrm>
-              <a:off x="1275805" y="191589"/>
-              <a:ext cx="1293224" cy="443043"/>
-            </a:xfrm>
-            <a:prstGeom prst="ellipse">
-              <a:avLst/>
-            </a:prstGeom>
-          </p:spPr>
-          <p:style>
-            <a:lnRef idx="2">
-              <a:schemeClr val="accent1">
-                <a:shade val="50000"/>
-              </a:schemeClr>
-            </a:lnRef>
-            <a:fillRef idx="1">
-              <a:schemeClr val="accent1"/>
-            </a:fillRef>
-            <a:effectRef idx="0">
-              <a:schemeClr val="accent1"/>
-            </a:effectRef>
-            <a:fontRef idx="minor">
-              <a:schemeClr val="lt1"/>
-            </a:fontRef>
-          </p:style>
-          <p:txBody>
-            <a:bodyPr rtlCol="0" anchor="ctr"/>
-            <a:lstStyle/>
-            <a:p>
-              <a:pPr algn="ctr"/>
-              <a:r>
-                <a:rPr lang="en-US" altLang="zh-CN" dirty="0" smtClean="0"/>
-                <a:t>ID</a:t>
-              </a:r>
-              <a:endParaRPr lang="zh-CN" altLang="en-US" dirty="0"/>
-            </a:p>
-          </p:txBody>
-        </p:sp>
-        <p:sp>
-          <p:nvSpPr>
-            <p:cNvPr id="64" name="椭圆 63"/>
-            <p:cNvSpPr/>
-            <p:nvPr/>
-          </p:nvSpPr>
-          <p:spPr>
-            <a:xfrm>
-              <a:off x="311331" y="861062"/>
-              <a:ext cx="1293224" cy="443043"/>
-            </a:xfrm>
-            <a:prstGeom prst="ellipse">
-              <a:avLst/>
-            </a:prstGeom>
-          </p:spPr>
-          <p:style>
-            <a:lnRef idx="2">
-              <a:schemeClr val="accent1">
-                <a:shade val="50000"/>
-              </a:schemeClr>
-            </a:lnRef>
-            <a:fillRef idx="1">
-              <a:schemeClr val="accent1"/>
-            </a:fillRef>
-            <a:effectRef idx="0">
-              <a:schemeClr val="accent1"/>
-            </a:effectRef>
-            <a:fontRef idx="minor">
-              <a:schemeClr val="lt1"/>
-            </a:fontRef>
-          </p:style>
-          <p:txBody>
-            <a:bodyPr rtlCol="0" anchor="ctr"/>
-            <a:lstStyle/>
-            <a:p>
-              <a:pPr algn="ctr"/>
-              <a:r>
-                <a:rPr lang="en-US" altLang="zh-CN" dirty="0" smtClean="0"/>
-                <a:t>name</a:t>
-              </a:r>
-              <a:endParaRPr lang="zh-CN" altLang="en-US" dirty="0"/>
-            </a:p>
-          </p:txBody>
-        </p:sp>
-        <p:sp>
-          <p:nvSpPr>
-            <p:cNvPr id="65" name="椭圆 64"/>
-            <p:cNvSpPr/>
-            <p:nvPr/>
-          </p:nvSpPr>
-          <p:spPr>
-            <a:xfrm>
-              <a:off x="291738" y="1690557"/>
-              <a:ext cx="1540732" cy="443043"/>
-            </a:xfrm>
-            <a:prstGeom prst="ellipse">
-              <a:avLst/>
-            </a:prstGeom>
-          </p:spPr>
-          <p:style>
-            <a:lnRef idx="2">
-              <a:schemeClr val="accent1">
-                <a:shade val="50000"/>
-              </a:schemeClr>
-            </a:lnRef>
-            <a:fillRef idx="1">
-              <a:schemeClr val="accent1"/>
-            </a:fillRef>
-            <a:effectRef idx="0">
-              <a:schemeClr val="accent1"/>
-            </a:effectRef>
-            <a:fontRef idx="minor">
-              <a:schemeClr val="lt1"/>
-            </a:fontRef>
-          </p:style>
-          <p:txBody>
-            <a:bodyPr rtlCol="0" anchor="ctr"/>
-            <a:lstStyle/>
-            <a:p>
-              <a:pPr algn="ctr"/>
-              <a:r>
-                <a:rPr lang="en-US" altLang="zh-CN" dirty="0" smtClean="0"/>
-                <a:t>Recipe ID</a:t>
-              </a:r>
-              <a:endParaRPr lang="zh-CN" altLang="en-US" dirty="0"/>
-            </a:p>
-          </p:txBody>
-        </p:sp>
-        <p:sp>
-          <p:nvSpPr>
-            <p:cNvPr id="66" name="椭圆 65"/>
-            <p:cNvSpPr/>
-            <p:nvPr/>
-          </p:nvSpPr>
-          <p:spPr>
-            <a:xfrm>
-              <a:off x="3126376" y="246859"/>
-              <a:ext cx="1391197" cy="443043"/>
-            </a:xfrm>
-            <a:prstGeom prst="ellipse">
-              <a:avLst/>
-            </a:prstGeom>
-          </p:spPr>
-          <p:style>
-            <a:lnRef idx="2">
-              <a:schemeClr val="accent1">
-                <a:shade val="50000"/>
-              </a:schemeClr>
-            </a:lnRef>
-            <a:fillRef idx="1">
-              <a:schemeClr val="accent1"/>
-            </a:fillRef>
-            <a:effectRef idx="0">
-              <a:schemeClr val="accent1"/>
-            </a:effectRef>
-            <a:fontRef idx="minor">
-              <a:schemeClr val="lt1"/>
-            </a:fontRef>
-          </p:style>
-          <p:txBody>
-            <a:bodyPr rtlCol="0" anchor="ctr"/>
-            <a:lstStyle/>
-            <a:p>
-              <a:pPr algn="ctr"/>
-              <a:r>
-                <a:rPr lang="en-US" altLang="zh-CN" dirty="0" smtClean="0"/>
-                <a:t>quantity</a:t>
-              </a:r>
-              <a:endParaRPr lang="zh-CN" altLang="en-US" dirty="0"/>
-            </a:p>
-          </p:txBody>
-        </p:sp>
-        <p:sp>
-          <p:nvSpPr>
-            <p:cNvPr id="67" name="椭圆 66"/>
-            <p:cNvSpPr/>
-            <p:nvPr/>
-          </p:nvSpPr>
-          <p:spPr>
-            <a:xfrm>
-              <a:off x="4254135" y="1142998"/>
-              <a:ext cx="1391197" cy="443043"/>
-            </a:xfrm>
-            <a:prstGeom prst="ellipse">
-              <a:avLst/>
-            </a:prstGeom>
-          </p:spPr>
-          <p:style>
-            <a:lnRef idx="2">
-              <a:schemeClr val="accent1">
-                <a:shade val="50000"/>
-              </a:schemeClr>
-            </a:lnRef>
-            <a:fillRef idx="1">
-              <a:schemeClr val="accent1"/>
-            </a:fillRef>
-            <a:effectRef idx="0">
-              <a:schemeClr val="accent1"/>
-            </a:effectRef>
-            <a:fontRef idx="minor">
-              <a:schemeClr val="lt1"/>
-            </a:fontRef>
-          </p:style>
-          <p:txBody>
-            <a:bodyPr rtlCol="0" anchor="ctr"/>
-            <a:lstStyle/>
-            <a:p>
-              <a:pPr algn="ctr"/>
-              <a:r>
-                <a:rPr lang="en-US" altLang="zh-CN" dirty="0" smtClean="0"/>
-                <a:t>unit</a:t>
-              </a:r>
-              <a:endParaRPr lang="zh-CN" altLang="en-US" dirty="0"/>
-            </a:p>
-          </p:txBody>
-        </p:sp>
-        <p:cxnSp>
-          <p:nvCxnSpPr>
-            <p:cNvPr id="69" name="直接连接符 68"/>
-            <p:cNvCxnSpPr>
-              <a:stCxn id="63" idx="5"/>
-              <a:endCxn id="11" idx="0"/>
-            </p:cNvCxnSpPr>
-            <p:nvPr/>
-          </p:nvCxnSpPr>
-          <p:spPr>
-            <a:xfrm>
-              <a:off x="2379640" y="569750"/>
-              <a:ext cx="511608" cy="699521"/>
-            </a:xfrm>
-            <a:prstGeom prst="line">
-              <a:avLst/>
-            </a:prstGeom>
-          </p:spPr>
-          <p:style>
-            <a:lnRef idx="1">
-              <a:schemeClr val="accent1"/>
-            </a:lnRef>
-            <a:fillRef idx="0">
-              <a:schemeClr val="accent1"/>
-            </a:fillRef>
-            <a:effectRef idx="0">
-              <a:schemeClr val="accent1"/>
-            </a:effectRef>
-            <a:fontRef idx="minor">
-              <a:schemeClr val="tx1"/>
-            </a:fontRef>
-          </p:style>
-        </p:cxnSp>
-        <p:cxnSp>
-          <p:nvCxnSpPr>
-            <p:cNvPr id="76" name="直接连接符 75"/>
-            <p:cNvCxnSpPr>
-              <a:stCxn id="11" idx="1"/>
-              <a:endCxn id="65" idx="7"/>
-            </p:cNvCxnSpPr>
-            <p:nvPr/>
-          </p:nvCxnSpPr>
-          <p:spPr>
-            <a:xfrm flipH="1">
-              <a:off x="1606835" y="1526175"/>
-              <a:ext cx="674813" cy="229264"/>
-            </a:xfrm>
-            <a:prstGeom prst="line">
-              <a:avLst/>
-            </a:prstGeom>
-          </p:spPr>
-          <p:style>
-            <a:lnRef idx="1">
-              <a:schemeClr val="accent1"/>
-            </a:lnRef>
-            <a:fillRef idx="0">
-              <a:schemeClr val="accent1"/>
-            </a:fillRef>
-            <a:effectRef idx="0">
-              <a:schemeClr val="accent1"/>
-            </a:effectRef>
-            <a:fontRef idx="minor">
-              <a:schemeClr val="tx1"/>
-            </a:fontRef>
-          </p:style>
-        </p:cxnSp>
-        <p:cxnSp>
-          <p:nvCxnSpPr>
-            <p:cNvPr id="78" name="直接连接符 77"/>
-            <p:cNvCxnSpPr>
-              <a:stCxn id="11" idx="1"/>
-              <a:endCxn id="64" idx="5"/>
-            </p:cNvCxnSpPr>
-            <p:nvPr/>
-          </p:nvCxnSpPr>
-          <p:spPr>
-            <a:xfrm flipH="1" flipV="1">
-              <a:off x="1415166" y="1239223"/>
-              <a:ext cx="866481" cy="286952"/>
-            </a:xfrm>
-            <a:prstGeom prst="line">
-              <a:avLst/>
-            </a:prstGeom>
-          </p:spPr>
-          <p:style>
-            <a:lnRef idx="1">
-              <a:schemeClr val="accent1"/>
-            </a:lnRef>
-            <a:fillRef idx="0">
-              <a:schemeClr val="accent1"/>
-            </a:fillRef>
-            <a:effectRef idx="0">
-              <a:schemeClr val="accent1"/>
-            </a:effectRef>
-            <a:fontRef idx="minor">
-              <a:schemeClr val="tx1"/>
-            </a:fontRef>
-          </p:style>
-        </p:cxnSp>
-        <p:cxnSp>
-          <p:nvCxnSpPr>
-            <p:cNvPr id="80" name="直接连接符 79"/>
-            <p:cNvCxnSpPr>
-              <a:stCxn id="66" idx="4"/>
-              <a:endCxn id="11" idx="3"/>
-            </p:cNvCxnSpPr>
-            <p:nvPr/>
-          </p:nvCxnSpPr>
-          <p:spPr>
-            <a:xfrm flipH="1">
-              <a:off x="3500847" y="689902"/>
-              <a:ext cx="321127" cy="836273"/>
-            </a:xfrm>
-            <a:prstGeom prst="line">
-              <a:avLst/>
-            </a:prstGeom>
-          </p:spPr>
-          <p:style>
-            <a:lnRef idx="1">
-              <a:schemeClr val="accent1"/>
-            </a:lnRef>
-            <a:fillRef idx="0">
-              <a:schemeClr val="accent1"/>
-            </a:fillRef>
-            <a:effectRef idx="0">
-              <a:schemeClr val="accent1"/>
-            </a:effectRef>
-            <a:fontRef idx="minor">
-              <a:schemeClr val="tx1"/>
-            </a:fontRef>
-          </p:style>
-        </p:cxnSp>
-        <p:cxnSp>
-          <p:nvCxnSpPr>
-            <p:cNvPr id="82" name="直接连接符 81"/>
-            <p:cNvCxnSpPr>
-              <a:stCxn id="67" idx="2"/>
-              <a:endCxn id="11" idx="3"/>
-            </p:cNvCxnSpPr>
-            <p:nvPr/>
-          </p:nvCxnSpPr>
-          <p:spPr>
-            <a:xfrm flipH="1">
-              <a:off x="3500847" y="1364520"/>
-              <a:ext cx="753287" cy="161655"/>
-            </a:xfrm>
-            <a:prstGeom prst="line">
-              <a:avLst/>
-            </a:prstGeom>
-          </p:spPr>
-          <p:style>
-            <a:lnRef idx="1">
-              <a:schemeClr val="accent1"/>
-            </a:lnRef>
-            <a:fillRef idx="0">
-              <a:schemeClr val="accent1"/>
-            </a:fillRef>
-            <a:effectRef idx="0">
-              <a:schemeClr val="accent1"/>
-            </a:effectRef>
-            <a:fontRef idx="minor">
-              <a:schemeClr val="tx1"/>
-            </a:fontRef>
-          </p:style>
-        </p:cxnSp>
-      </p:grpSp>
-      <p:grpSp>
-        <p:nvGrpSpPr>
           <p:cNvPr id="97" name="组合 96"/>
           <p:cNvGrpSpPr/>
           <p:nvPr/>
@@ -4470,7 +3428,7 @@
               <a:pPr algn="ctr"/>
               <a:r>
                 <a:rPr lang="en-US" altLang="zh-CN" dirty="0" smtClean="0"/>
-                <a:t>ID</a:t>
+                <a:t>stepID</a:t>
               </a:r>
               <a:endParaRPr lang="zh-CN" altLang="en-US" dirty="0"/>
             </a:p>
@@ -4859,7 +3817,7 @@
         </p:nvSpPr>
         <p:spPr>
           <a:xfrm>
-            <a:off x="3440031" y="4357796"/>
+            <a:off x="3244959" y="3663092"/>
             <a:ext cx="301686" cy="369332"/>
           </a:xfrm>
           <a:prstGeom prst="rect">
@@ -4889,8 +3847,8 @@
         </p:nvSpPr>
         <p:spPr>
           <a:xfrm>
-            <a:off x="2570734" y="1279810"/>
-            <a:ext cx="300082" cy="369332"/>
+            <a:off x="2430138" y="1848579"/>
+            <a:ext cx="381836" cy="369332"/>
           </a:xfrm>
           <a:prstGeom prst="rect">
             <a:avLst/>
@@ -4905,7 +3863,7 @@
           <a:p>
             <a:r>
               <a:rPr lang="en-US" altLang="zh-CN" dirty="0"/>
-              <a:t>*</a:t>
+              <a:t>M</a:t>
             </a:r>
             <a:endParaRPr lang="zh-CN" altLang="en-US" dirty="0"/>
           </a:p>
@@ -5029,7 +3987,7 @@
         </p:nvSpPr>
         <p:spPr>
           <a:xfrm>
-            <a:off x="4531774" y="4511635"/>
+            <a:off x="5159927" y="4441160"/>
             <a:ext cx="301686" cy="369332"/>
           </a:xfrm>
           <a:prstGeom prst="rect">
@@ -5059,8 +4017,8 @@
         </p:nvSpPr>
         <p:spPr>
           <a:xfrm>
-            <a:off x="8301024" y="4511635"/>
-            <a:ext cx="300082" cy="369332"/>
+            <a:off x="7831147" y="4441160"/>
+            <a:ext cx="381836" cy="369332"/>
           </a:xfrm>
           <a:prstGeom prst="rect">
             <a:avLst/>
@@ -5075,7 +4033,7 @@
           <a:p>
             <a:r>
               <a:rPr lang="en-US" altLang="zh-CN" dirty="0"/>
-              <a:t>*</a:t>
+              <a:t>M</a:t>
             </a:r>
             <a:endParaRPr lang="zh-CN" altLang="en-US" dirty="0"/>
           </a:p>
@@ -5199,8 +4157,8 @@
         </p:nvSpPr>
         <p:spPr>
           <a:xfrm>
-            <a:off x="8604489" y="1944825"/>
-            <a:ext cx="300082" cy="369332"/>
+            <a:off x="8309476" y="2422950"/>
+            <a:ext cx="381836" cy="369332"/>
           </a:xfrm>
           <a:prstGeom prst="rect">
             <a:avLst/>
@@ -5215,7 +4173,7 @@
           <a:p>
             <a:r>
               <a:rPr lang="en-US" altLang="zh-CN" dirty="0"/>
-              <a:t>*</a:t>
+              <a:t>M</a:t>
             </a:r>
             <a:endParaRPr lang="zh-CN" altLang="en-US" dirty="0"/>
           </a:p>
@@ -5229,8 +4187,8 @@
         </p:nvSpPr>
         <p:spPr>
           <a:xfrm>
-            <a:off x="3884380" y="4289752"/>
-            <a:ext cx="300082" cy="369332"/>
+            <a:off x="4369208" y="3724010"/>
+            <a:ext cx="333746" cy="369332"/>
           </a:xfrm>
           <a:prstGeom prst="rect">
             <a:avLst/>
@@ -5245,7 +4203,7 @@
           <a:p>
             <a:r>
               <a:rPr lang="en-US" altLang="zh-CN" dirty="0"/>
-              <a:t>*</a:t>
+              <a:t>N</a:t>
             </a:r>
             <a:endParaRPr lang="zh-CN" altLang="en-US" dirty="0"/>
           </a:p>
@@ -5530,6 +4488,1232 @@
           </a:fontRef>
         </p:style>
       </p:cxnSp>
+      <p:grpSp>
+        <p:nvGrpSpPr>
+          <p:cNvPr id="17" name="组合 16"/>
+          <p:cNvGrpSpPr/>
+          <p:nvPr/>
+        </p:nvGrpSpPr>
+        <p:grpSpPr>
+          <a:xfrm>
+            <a:off x="189144" y="2827563"/>
+            <a:ext cx="7361525" cy="3498552"/>
+            <a:chOff x="189144" y="2827563"/>
+            <a:chExt cx="7361525" cy="3498552"/>
+          </a:xfrm>
+        </p:grpSpPr>
+        <p:grpSp>
+          <p:nvGrpSpPr>
+            <p:cNvPr id="61" name="组合 60"/>
+            <p:cNvGrpSpPr/>
+            <p:nvPr/>
+          </p:nvGrpSpPr>
+          <p:grpSpPr>
+            <a:xfrm>
+              <a:off x="189144" y="3701143"/>
+              <a:ext cx="7361525" cy="2624972"/>
+              <a:chOff x="217935" y="2970712"/>
+              <a:chExt cx="6914631" cy="3212607"/>
+            </a:xfrm>
+          </p:grpSpPr>
+          <p:sp>
+            <p:nvSpPr>
+              <p:cNvPr id="10" name="圆角矩形 9"/>
+              <p:cNvSpPr/>
+              <p:nvPr/>
+            </p:nvSpPr>
+            <p:spPr>
+              <a:xfrm>
+                <a:off x="3074813" y="4165959"/>
+                <a:ext cx="1219200" cy="513805"/>
+              </a:xfrm>
+              <a:prstGeom prst="roundRect">
+                <a:avLst/>
+              </a:prstGeom>
+            </p:spPr>
+            <p:style>
+              <a:lnRef idx="2">
+                <a:schemeClr val="accent1">
+                  <a:shade val="50000"/>
+                </a:schemeClr>
+              </a:lnRef>
+              <a:fillRef idx="1">
+                <a:schemeClr val="accent1"/>
+              </a:fillRef>
+              <a:effectRef idx="0">
+                <a:schemeClr val="accent1"/>
+              </a:effectRef>
+              <a:fontRef idx="minor">
+                <a:schemeClr val="lt1"/>
+              </a:fontRef>
+            </p:style>
+            <p:txBody>
+              <a:bodyPr rtlCol="0" anchor="ctr"/>
+              <a:lstStyle/>
+              <a:p>
+                <a:pPr algn="ctr"/>
+                <a:r>
+                  <a:rPr lang="en-US" altLang="zh-CN" dirty="0" smtClean="0"/>
+                  <a:t>Recipe</a:t>
+                </a:r>
+                <a:endParaRPr lang="zh-CN" altLang="en-US" dirty="0"/>
+              </a:p>
+            </p:txBody>
+          </p:sp>
+          <p:sp>
+            <p:nvSpPr>
+              <p:cNvPr id="25" name="椭圆 24"/>
+              <p:cNvSpPr/>
+              <p:nvPr/>
+            </p:nvSpPr>
+            <p:spPr>
+              <a:xfrm>
+                <a:off x="472865" y="4380139"/>
+                <a:ext cx="1288869" cy="383177"/>
+              </a:xfrm>
+              <a:prstGeom prst="ellipse">
+                <a:avLst/>
+              </a:prstGeom>
+            </p:spPr>
+            <p:style>
+              <a:lnRef idx="2">
+                <a:schemeClr val="accent1">
+                  <a:shade val="50000"/>
+                </a:schemeClr>
+              </a:lnRef>
+              <a:fillRef idx="1">
+                <a:schemeClr val="accent1"/>
+              </a:fillRef>
+              <a:effectRef idx="0">
+                <a:schemeClr val="accent1"/>
+              </a:effectRef>
+              <a:fontRef idx="minor">
+                <a:schemeClr val="lt1"/>
+              </a:fontRef>
+            </p:style>
+            <p:txBody>
+              <a:bodyPr rtlCol="0" anchor="ctr"/>
+              <a:lstStyle/>
+              <a:p>
+                <a:pPr algn="ctr"/>
+                <a:r>
+                  <a:rPr lang="en-US" altLang="zh-CN" dirty="0" smtClean="0"/>
+                  <a:t>recipeID</a:t>
+                </a:r>
+                <a:endParaRPr lang="zh-CN" altLang="en-US" dirty="0"/>
+              </a:p>
+            </p:txBody>
+          </p:sp>
+          <p:sp>
+            <p:nvSpPr>
+              <p:cNvPr id="26" name="椭圆 25"/>
+              <p:cNvSpPr/>
+              <p:nvPr/>
+            </p:nvSpPr>
+            <p:spPr>
+              <a:xfrm>
+                <a:off x="217935" y="5050540"/>
+                <a:ext cx="1942011" cy="383177"/>
+              </a:xfrm>
+              <a:prstGeom prst="ellipse">
+                <a:avLst/>
+              </a:prstGeom>
+            </p:spPr>
+            <p:style>
+              <a:lnRef idx="2">
+                <a:schemeClr val="accent1">
+                  <a:shade val="50000"/>
+                </a:schemeClr>
+              </a:lnRef>
+              <a:fillRef idx="1">
+                <a:schemeClr val="accent1"/>
+              </a:fillRef>
+              <a:effectRef idx="0">
+                <a:schemeClr val="accent1"/>
+              </a:effectRef>
+              <a:fontRef idx="minor">
+                <a:schemeClr val="lt1"/>
+              </a:fontRef>
+            </p:style>
+            <p:txBody>
+              <a:bodyPr rtlCol="0" anchor="ctr"/>
+              <a:lstStyle/>
+              <a:p>
+                <a:pPr algn="ctr"/>
+                <a:r>
+                  <a:rPr lang="en-US" altLang="zh-CN" dirty="0" smtClean="0"/>
+                  <a:t>recipeName</a:t>
+                </a:r>
+                <a:endParaRPr lang="zh-CN" altLang="en-US" dirty="0"/>
+              </a:p>
+            </p:txBody>
+          </p:sp>
+          <p:sp>
+            <p:nvSpPr>
+              <p:cNvPr id="27" name="椭圆 26"/>
+              <p:cNvSpPr/>
+              <p:nvPr/>
+            </p:nvSpPr>
+            <p:spPr>
+              <a:xfrm>
+                <a:off x="514088" y="5768550"/>
+                <a:ext cx="1942011" cy="383177"/>
+              </a:xfrm>
+              <a:prstGeom prst="ellipse">
+                <a:avLst/>
+              </a:prstGeom>
+            </p:spPr>
+            <p:style>
+              <a:lnRef idx="2">
+                <a:schemeClr val="accent1">
+                  <a:shade val="50000"/>
+                </a:schemeClr>
+              </a:lnRef>
+              <a:fillRef idx="1">
+                <a:schemeClr val="accent1"/>
+              </a:fillRef>
+              <a:effectRef idx="0">
+                <a:schemeClr val="accent1"/>
+              </a:effectRef>
+              <a:fontRef idx="minor">
+                <a:schemeClr val="lt1"/>
+              </a:fontRef>
+            </p:style>
+            <p:txBody>
+              <a:bodyPr rtlCol="0" anchor="ctr"/>
+              <a:lstStyle/>
+              <a:p>
+                <a:pPr algn="ctr"/>
+                <a:r>
+                  <a:rPr lang="en-US" altLang="zh-CN" dirty="0" smtClean="0"/>
+                  <a:t>Description</a:t>
+                </a:r>
+                <a:endParaRPr lang="zh-CN" altLang="en-US" dirty="0"/>
+              </a:p>
+            </p:txBody>
+          </p:sp>
+          <p:sp>
+            <p:nvSpPr>
+              <p:cNvPr id="28" name="椭圆 27"/>
+              <p:cNvSpPr/>
+              <p:nvPr/>
+            </p:nvSpPr>
+            <p:spPr>
+              <a:xfrm>
+                <a:off x="4854393" y="5800142"/>
+                <a:ext cx="1942011" cy="383177"/>
+              </a:xfrm>
+              <a:prstGeom prst="ellipse">
+                <a:avLst/>
+              </a:prstGeom>
+            </p:spPr>
+            <p:style>
+              <a:lnRef idx="2">
+                <a:schemeClr val="accent1">
+                  <a:shade val="50000"/>
+                </a:schemeClr>
+              </a:lnRef>
+              <a:fillRef idx="1">
+                <a:schemeClr val="accent1"/>
+              </a:fillRef>
+              <a:effectRef idx="0">
+                <a:schemeClr val="accent1"/>
+              </a:effectRef>
+              <a:fontRef idx="minor">
+                <a:schemeClr val="lt1"/>
+              </a:fontRef>
+            </p:style>
+            <p:txBody>
+              <a:bodyPr rtlCol="0" anchor="ctr"/>
+              <a:lstStyle/>
+              <a:p>
+                <a:pPr algn="ctr"/>
+                <a:r>
+                  <a:rPr lang="en-US" altLang="zh-CN" dirty="0" smtClean="0"/>
+                  <a:t>Preparation</a:t>
+                </a:r>
+                <a:endParaRPr lang="zh-CN" altLang="en-US" dirty="0"/>
+              </a:p>
+            </p:txBody>
+          </p:sp>
+          <p:sp>
+            <p:nvSpPr>
+              <p:cNvPr id="29" name="椭圆 28"/>
+              <p:cNvSpPr/>
+              <p:nvPr/>
+            </p:nvSpPr>
+            <p:spPr>
+              <a:xfrm>
+                <a:off x="326570" y="3739242"/>
+                <a:ext cx="1942011" cy="383177"/>
+              </a:xfrm>
+              <a:prstGeom prst="ellipse">
+                <a:avLst/>
+              </a:prstGeom>
+            </p:spPr>
+            <p:style>
+              <a:lnRef idx="2">
+                <a:schemeClr val="accent1">
+                  <a:shade val="50000"/>
+                </a:schemeClr>
+              </a:lnRef>
+              <a:fillRef idx="1">
+                <a:schemeClr val="accent1"/>
+              </a:fillRef>
+              <a:effectRef idx="0">
+                <a:schemeClr val="accent1"/>
+              </a:effectRef>
+              <a:fontRef idx="minor">
+                <a:schemeClr val="lt1"/>
+              </a:fontRef>
+            </p:style>
+            <p:txBody>
+              <a:bodyPr rtlCol="0" anchor="ctr"/>
+              <a:lstStyle/>
+              <a:p>
+                <a:pPr algn="ctr"/>
+                <a:r>
+                  <a:rPr lang="en-US" altLang="zh-CN" dirty="0" smtClean="0"/>
+                  <a:t>cookingTime</a:t>
+                </a:r>
+                <a:endParaRPr lang="zh-CN" altLang="en-US" dirty="0"/>
+              </a:p>
+            </p:txBody>
+          </p:sp>
+          <p:sp>
+            <p:nvSpPr>
+              <p:cNvPr id="30" name="椭圆 29"/>
+              <p:cNvSpPr/>
+              <p:nvPr/>
+            </p:nvSpPr>
+            <p:spPr>
+              <a:xfrm>
+                <a:off x="326569" y="2970712"/>
+                <a:ext cx="1942011" cy="383177"/>
+              </a:xfrm>
+              <a:prstGeom prst="ellipse">
+                <a:avLst/>
+              </a:prstGeom>
+            </p:spPr>
+            <p:style>
+              <a:lnRef idx="2">
+                <a:schemeClr val="accent1">
+                  <a:shade val="50000"/>
+                </a:schemeClr>
+              </a:lnRef>
+              <a:fillRef idx="1">
+                <a:schemeClr val="accent1"/>
+              </a:fillRef>
+              <a:effectRef idx="0">
+                <a:schemeClr val="accent1"/>
+              </a:effectRef>
+              <a:fontRef idx="minor">
+                <a:schemeClr val="lt1"/>
+              </a:fontRef>
+            </p:style>
+            <p:txBody>
+              <a:bodyPr rtlCol="0" anchor="ctr"/>
+              <a:lstStyle/>
+              <a:p>
+                <a:pPr algn="ctr"/>
+                <a:r>
+                  <a:rPr lang="en-US" altLang="zh-CN" dirty="0" smtClean="0"/>
+                  <a:t>ImagePath</a:t>
+                </a:r>
+                <a:endParaRPr lang="zh-CN" altLang="en-US" dirty="0"/>
+              </a:p>
+            </p:txBody>
+          </p:sp>
+          <p:sp>
+            <p:nvSpPr>
+              <p:cNvPr id="32" name="椭圆 31"/>
+              <p:cNvSpPr/>
+              <p:nvPr/>
+            </p:nvSpPr>
+            <p:spPr>
+              <a:xfrm>
+                <a:off x="5190555" y="5021035"/>
+                <a:ext cx="1942011" cy="383177"/>
+              </a:xfrm>
+              <a:prstGeom prst="ellipse">
+                <a:avLst/>
+              </a:prstGeom>
+            </p:spPr>
+            <p:style>
+              <a:lnRef idx="2">
+                <a:schemeClr val="accent1">
+                  <a:shade val="50000"/>
+                </a:schemeClr>
+              </a:lnRef>
+              <a:fillRef idx="1">
+                <a:schemeClr val="accent1"/>
+              </a:fillRef>
+              <a:effectRef idx="0">
+                <a:schemeClr val="accent1"/>
+              </a:effectRef>
+              <a:fontRef idx="minor">
+                <a:schemeClr val="lt1"/>
+              </a:fontRef>
+            </p:style>
+            <p:txBody>
+              <a:bodyPr rtlCol="0" anchor="ctr"/>
+              <a:lstStyle/>
+              <a:p>
+                <a:pPr algn="ctr"/>
+                <a:r>
+                  <a:rPr lang="en-US" altLang="zh-CN" dirty="0" smtClean="0"/>
+                  <a:t>Status</a:t>
+                </a:r>
+                <a:endParaRPr lang="zh-CN" altLang="en-US" dirty="0"/>
+              </a:p>
+            </p:txBody>
+          </p:sp>
+          <p:cxnSp>
+            <p:nvCxnSpPr>
+              <p:cNvPr id="34" name="直接连接符 33"/>
+              <p:cNvCxnSpPr>
+                <a:stCxn id="30" idx="5"/>
+                <a:endCxn id="10" idx="1"/>
+              </p:cNvCxnSpPr>
+              <p:nvPr/>
+            </p:nvCxnSpPr>
+            <p:spPr>
+              <a:xfrm>
+                <a:off x="1984179" y="3297774"/>
+                <a:ext cx="1090634" cy="1125088"/>
+              </a:xfrm>
+              <a:prstGeom prst="line">
+                <a:avLst/>
+              </a:prstGeom>
+            </p:spPr>
+            <p:style>
+              <a:lnRef idx="1">
+                <a:schemeClr val="accent1"/>
+              </a:lnRef>
+              <a:fillRef idx="0">
+                <a:schemeClr val="accent1"/>
+              </a:fillRef>
+              <a:effectRef idx="0">
+                <a:schemeClr val="accent1"/>
+              </a:effectRef>
+              <a:fontRef idx="minor">
+                <a:schemeClr val="tx1"/>
+              </a:fontRef>
+            </p:style>
+          </p:cxnSp>
+          <p:cxnSp>
+            <p:nvCxnSpPr>
+              <p:cNvPr id="36" name="直接连接符 35"/>
+              <p:cNvCxnSpPr>
+                <a:stCxn id="32" idx="0"/>
+                <a:endCxn id="10" idx="3"/>
+              </p:cNvCxnSpPr>
+              <p:nvPr/>
+            </p:nvCxnSpPr>
+            <p:spPr>
+              <a:xfrm flipH="1" flipV="1">
+                <a:off x="4294013" y="4422861"/>
+                <a:ext cx="1867547" cy="598174"/>
+              </a:xfrm>
+              <a:prstGeom prst="line">
+                <a:avLst/>
+              </a:prstGeom>
+            </p:spPr>
+            <p:style>
+              <a:lnRef idx="1">
+                <a:schemeClr val="accent1"/>
+              </a:lnRef>
+              <a:fillRef idx="0">
+                <a:schemeClr val="accent1"/>
+              </a:fillRef>
+              <a:effectRef idx="0">
+                <a:schemeClr val="accent1"/>
+              </a:effectRef>
+              <a:fontRef idx="minor">
+                <a:schemeClr val="tx1"/>
+              </a:fontRef>
+            </p:style>
+          </p:cxnSp>
+          <p:cxnSp>
+            <p:nvCxnSpPr>
+              <p:cNvPr id="38" name="直接连接符 37"/>
+              <p:cNvCxnSpPr>
+                <a:stCxn id="29" idx="4"/>
+                <a:endCxn id="10" idx="1"/>
+              </p:cNvCxnSpPr>
+              <p:nvPr/>
+            </p:nvCxnSpPr>
+            <p:spPr>
+              <a:xfrm>
+                <a:off x="1297576" y="4122419"/>
+                <a:ext cx="1777238" cy="300443"/>
+              </a:xfrm>
+              <a:prstGeom prst="line">
+                <a:avLst/>
+              </a:prstGeom>
+            </p:spPr>
+            <p:style>
+              <a:lnRef idx="1">
+                <a:schemeClr val="accent1"/>
+              </a:lnRef>
+              <a:fillRef idx="0">
+                <a:schemeClr val="accent1"/>
+              </a:fillRef>
+              <a:effectRef idx="0">
+                <a:schemeClr val="accent1"/>
+              </a:effectRef>
+              <a:fontRef idx="minor">
+                <a:schemeClr val="tx1"/>
+              </a:fontRef>
+            </p:style>
+          </p:cxnSp>
+          <p:cxnSp>
+            <p:nvCxnSpPr>
+              <p:cNvPr id="40" name="直接连接符 39"/>
+              <p:cNvCxnSpPr>
+                <a:stCxn id="25" idx="6"/>
+                <a:endCxn id="10" idx="1"/>
+              </p:cNvCxnSpPr>
+              <p:nvPr/>
+            </p:nvCxnSpPr>
+            <p:spPr>
+              <a:xfrm flipV="1">
+                <a:off x="1761734" y="4422861"/>
+                <a:ext cx="1313079" cy="148866"/>
+              </a:xfrm>
+              <a:prstGeom prst="line">
+                <a:avLst/>
+              </a:prstGeom>
+            </p:spPr>
+            <p:style>
+              <a:lnRef idx="1">
+                <a:schemeClr val="accent1"/>
+              </a:lnRef>
+              <a:fillRef idx="0">
+                <a:schemeClr val="accent1"/>
+              </a:fillRef>
+              <a:effectRef idx="0">
+                <a:schemeClr val="accent1"/>
+              </a:effectRef>
+              <a:fontRef idx="minor">
+                <a:schemeClr val="tx1"/>
+              </a:fontRef>
+            </p:style>
+          </p:cxnSp>
+          <p:cxnSp>
+            <p:nvCxnSpPr>
+              <p:cNvPr id="42" name="直接连接符 41"/>
+              <p:cNvCxnSpPr>
+                <a:stCxn id="26" idx="7"/>
+                <a:endCxn id="10" idx="2"/>
+              </p:cNvCxnSpPr>
+              <p:nvPr/>
+            </p:nvCxnSpPr>
+            <p:spPr>
+              <a:xfrm flipV="1">
+                <a:off x="1875545" y="4679764"/>
+                <a:ext cx="1808868" cy="426892"/>
+              </a:xfrm>
+              <a:prstGeom prst="line">
+                <a:avLst/>
+              </a:prstGeom>
+            </p:spPr>
+            <p:style>
+              <a:lnRef idx="1">
+                <a:schemeClr val="accent1"/>
+              </a:lnRef>
+              <a:fillRef idx="0">
+                <a:schemeClr val="accent1"/>
+              </a:fillRef>
+              <a:effectRef idx="0">
+                <a:schemeClr val="accent1"/>
+              </a:effectRef>
+              <a:fontRef idx="minor">
+                <a:schemeClr val="tx1"/>
+              </a:fontRef>
+            </p:style>
+          </p:cxnSp>
+          <p:cxnSp>
+            <p:nvCxnSpPr>
+              <p:cNvPr id="44" name="直接连接符 43"/>
+              <p:cNvCxnSpPr>
+                <a:stCxn id="27" idx="0"/>
+                <a:endCxn id="10" idx="2"/>
+              </p:cNvCxnSpPr>
+              <p:nvPr/>
+            </p:nvCxnSpPr>
+            <p:spPr>
+              <a:xfrm flipV="1">
+                <a:off x="1485093" y="4679764"/>
+                <a:ext cx="2199320" cy="1088787"/>
+              </a:xfrm>
+              <a:prstGeom prst="line">
+                <a:avLst/>
+              </a:prstGeom>
+            </p:spPr>
+            <p:style>
+              <a:lnRef idx="1">
+                <a:schemeClr val="accent1"/>
+              </a:lnRef>
+              <a:fillRef idx="0">
+                <a:schemeClr val="accent1"/>
+              </a:fillRef>
+              <a:effectRef idx="0">
+                <a:schemeClr val="accent1"/>
+              </a:effectRef>
+              <a:fontRef idx="minor">
+                <a:schemeClr val="tx1"/>
+              </a:fontRef>
+            </p:style>
+          </p:cxnSp>
+          <p:cxnSp>
+            <p:nvCxnSpPr>
+              <p:cNvPr id="46" name="直接连接符 45"/>
+              <p:cNvCxnSpPr>
+                <a:stCxn id="28" idx="0"/>
+                <a:endCxn id="10" idx="2"/>
+              </p:cNvCxnSpPr>
+              <p:nvPr/>
+            </p:nvCxnSpPr>
+            <p:spPr>
+              <a:xfrm flipH="1" flipV="1">
+                <a:off x="3684414" y="4679764"/>
+                <a:ext cx="2140985" cy="1120378"/>
+              </a:xfrm>
+              <a:prstGeom prst="line">
+                <a:avLst/>
+              </a:prstGeom>
+            </p:spPr>
+            <p:style>
+              <a:lnRef idx="1">
+                <a:schemeClr val="accent1"/>
+              </a:lnRef>
+              <a:fillRef idx="0">
+                <a:schemeClr val="accent1"/>
+              </a:fillRef>
+              <a:effectRef idx="0">
+                <a:schemeClr val="accent1"/>
+              </a:effectRef>
+              <a:fontRef idx="minor">
+                <a:schemeClr val="tx1"/>
+              </a:fontRef>
+            </p:style>
+          </p:cxnSp>
+        </p:grpSp>
+        <p:sp>
+          <p:nvSpPr>
+            <p:cNvPr id="72" name="椭圆 71"/>
+            <p:cNvSpPr/>
+            <p:nvPr/>
+          </p:nvSpPr>
+          <p:spPr>
+            <a:xfrm>
+              <a:off x="2916773" y="2827563"/>
+              <a:ext cx="2438997" cy="486722"/>
+            </a:xfrm>
+            <a:prstGeom prst="ellipse">
+              <a:avLst/>
+            </a:prstGeom>
+          </p:spPr>
+          <p:style>
+            <a:lnRef idx="2">
+              <a:schemeClr val="accent1">
+                <a:shade val="50000"/>
+              </a:schemeClr>
+            </a:lnRef>
+            <a:fillRef idx="1">
+              <a:schemeClr val="accent1"/>
+            </a:fillRef>
+            <a:effectRef idx="0">
+              <a:schemeClr val="accent1"/>
+            </a:effectRef>
+            <a:fontRef idx="minor">
+              <a:schemeClr val="lt1"/>
+            </a:fontRef>
+          </p:style>
+          <p:txBody>
+            <a:bodyPr rtlCol="0" anchor="ctr"/>
+            <a:lstStyle/>
+            <a:p>
+              <a:pPr algn="ctr"/>
+              <a:r>
+                <a:rPr lang="en-US" altLang="zh-CN" dirty="0" smtClean="0"/>
+                <a:t>availablePeople</a:t>
+              </a:r>
+              <a:endParaRPr lang="zh-CN" altLang="en-US" dirty="0"/>
+            </a:p>
+          </p:txBody>
+        </p:sp>
+        <p:cxnSp>
+          <p:nvCxnSpPr>
+            <p:cNvPr id="73" name="直接连接符 72"/>
+            <p:cNvCxnSpPr>
+              <a:stCxn id="72" idx="4"/>
+              <a:endCxn id="10" idx="0"/>
+            </p:cNvCxnSpPr>
+            <p:nvPr/>
+          </p:nvCxnSpPr>
+          <p:spPr>
+            <a:xfrm flipH="1">
+              <a:off x="3879662" y="3314285"/>
+              <a:ext cx="256610" cy="1363476"/>
+            </a:xfrm>
+            <a:prstGeom prst="line">
+              <a:avLst/>
+            </a:prstGeom>
+          </p:spPr>
+          <p:style>
+            <a:lnRef idx="1">
+              <a:schemeClr val="accent1"/>
+            </a:lnRef>
+            <a:fillRef idx="0">
+              <a:schemeClr val="accent1"/>
+            </a:fillRef>
+            <a:effectRef idx="0">
+              <a:schemeClr val="accent1"/>
+            </a:effectRef>
+            <a:fontRef idx="minor">
+              <a:schemeClr val="tx1"/>
+            </a:fontRef>
+          </p:style>
+        </p:cxnSp>
+      </p:grpSp>
+      <p:grpSp>
+        <p:nvGrpSpPr>
+          <p:cNvPr id="13" name="组合 12"/>
+          <p:cNvGrpSpPr/>
+          <p:nvPr/>
+        </p:nvGrpSpPr>
+        <p:grpSpPr>
+          <a:xfrm>
+            <a:off x="0" y="191589"/>
+            <a:ext cx="5769025" cy="1380027"/>
+            <a:chOff x="0" y="191589"/>
+            <a:chExt cx="5769025" cy="1380027"/>
+          </a:xfrm>
+        </p:grpSpPr>
+        <p:grpSp>
+          <p:nvGrpSpPr>
+            <p:cNvPr id="84" name="组合 83"/>
+            <p:cNvGrpSpPr/>
+            <p:nvPr/>
+          </p:nvGrpSpPr>
+          <p:grpSpPr>
+            <a:xfrm>
+              <a:off x="0" y="191589"/>
+              <a:ext cx="5323441" cy="1380027"/>
+              <a:chOff x="291738" y="191589"/>
+              <a:chExt cx="5382542" cy="1942011"/>
+            </a:xfrm>
+          </p:grpSpPr>
+          <p:sp>
+            <p:nvSpPr>
+              <p:cNvPr id="11" name="圆角矩形 10"/>
+              <p:cNvSpPr/>
+              <p:nvPr/>
+            </p:nvSpPr>
+            <p:spPr>
+              <a:xfrm>
+                <a:off x="2281647" y="1269272"/>
+                <a:ext cx="1219200" cy="513805"/>
+              </a:xfrm>
+              <a:prstGeom prst="roundRect">
+                <a:avLst/>
+              </a:prstGeom>
+            </p:spPr>
+            <p:style>
+              <a:lnRef idx="2">
+                <a:schemeClr val="accent1">
+                  <a:shade val="50000"/>
+                </a:schemeClr>
+              </a:lnRef>
+              <a:fillRef idx="1">
+                <a:schemeClr val="accent1"/>
+              </a:fillRef>
+              <a:effectRef idx="0">
+                <a:schemeClr val="accent1"/>
+              </a:effectRef>
+              <a:fontRef idx="minor">
+                <a:schemeClr val="lt1"/>
+              </a:fontRef>
+            </p:style>
+            <p:txBody>
+              <a:bodyPr rtlCol="0" anchor="ctr"/>
+              <a:lstStyle/>
+              <a:p>
+                <a:pPr algn="ctr"/>
+                <a:r>
+                  <a:rPr lang="en-US" altLang="zh-CN" dirty="0" smtClean="0"/>
+                  <a:t>Ingredient</a:t>
+                </a:r>
+                <a:endParaRPr lang="zh-CN" altLang="en-US" dirty="0"/>
+              </a:p>
+            </p:txBody>
+          </p:sp>
+          <p:sp>
+            <p:nvSpPr>
+              <p:cNvPr id="63" name="椭圆 62"/>
+              <p:cNvSpPr/>
+              <p:nvPr/>
+            </p:nvSpPr>
+            <p:spPr>
+              <a:xfrm>
+                <a:off x="599921" y="191589"/>
+                <a:ext cx="1969108" cy="443043"/>
+              </a:xfrm>
+              <a:prstGeom prst="ellipse">
+                <a:avLst/>
+              </a:prstGeom>
+            </p:spPr>
+            <p:style>
+              <a:lnRef idx="2">
+                <a:schemeClr val="accent1">
+                  <a:shade val="50000"/>
+                </a:schemeClr>
+              </a:lnRef>
+              <a:fillRef idx="1">
+                <a:schemeClr val="accent1"/>
+              </a:fillRef>
+              <a:effectRef idx="0">
+                <a:schemeClr val="accent1"/>
+              </a:effectRef>
+              <a:fontRef idx="minor">
+                <a:schemeClr val="lt1"/>
+              </a:fontRef>
+            </p:style>
+            <p:txBody>
+              <a:bodyPr rtlCol="0" anchor="ctr"/>
+              <a:lstStyle/>
+              <a:p>
+                <a:pPr algn="ctr"/>
+                <a:r>
+                  <a:rPr lang="en-US" altLang="zh-CN" dirty="0" smtClean="0"/>
+                  <a:t>ingredientID</a:t>
+                </a:r>
+                <a:endParaRPr lang="zh-CN" altLang="en-US" dirty="0"/>
+              </a:p>
+            </p:txBody>
+          </p:sp>
+          <p:sp>
+            <p:nvSpPr>
+              <p:cNvPr id="64" name="椭圆 63"/>
+              <p:cNvSpPr/>
+              <p:nvPr/>
+            </p:nvSpPr>
+            <p:spPr>
+              <a:xfrm>
+                <a:off x="311331" y="861062"/>
+                <a:ext cx="1293224" cy="443043"/>
+              </a:xfrm>
+              <a:prstGeom prst="ellipse">
+                <a:avLst/>
+              </a:prstGeom>
+            </p:spPr>
+            <p:style>
+              <a:lnRef idx="2">
+                <a:schemeClr val="accent1">
+                  <a:shade val="50000"/>
+                </a:schemeClr>
+              </a:lnRef>
+              <a:fillRef idx="1">
+                <a:schemeClr val="accent1"/>
+              </a:fillRef>
+              <a:effectRef idx="0">
+                <a:schemeClr val="accent1"/>
+              </a:effectRef>
+              <a:fontRef idx="minor">
+                <a:schemeClr val="lt1"/>
+              </a:fontRef>
+            </p:style>
+            <p:txBody>
+              <a:bodyPr rtlCol="0" anchor="ctr"/>
+              <a:lstStyle/>
+              <a:p>
+                <a:pPr algn="ctr"/>
+                <a:r>
+                  <a:rPr lang="en-US" altLang="zh-CN" dirty="0" smtClean="0"/>
+                  <a:t>name</a:t>
+                </a:r>
+                <a:endParaRPr lang="zh-CN" altLang="en-US" dirty="0"/>
+              </a:p>
+            </p:txBody>
+          </p:sp>
+          <p:sp>
+            <p:nvSpPr>
+              <p:cNvPr id="65" name="椭圆 64"/>
+              <p:cNvSpPr/>
+              <p:nvPr/>
+            </p:nvSpPr>
+            <p:spPr>
+              <a:xfrm>
+                <a:off x="291738" y="1690557"/>
+                <a:ext cx="1540732" cy="443043"/>
+              </a:xfrm>
+              <a:prstGeom prst="ellipse">
+                <a:avLst/>
+              </a:prstGeom>
+            </p:spPr>
+            <p:style>
+              <a:lnRef idx="2">
+                <a:schemeClr val="accent1">
+                  <a:shade val="50000"/>
+                </a:schemeClr>
+              </a:lnRef>
+              <a:fillRef idx="1">
+                <a:schemeClr val="accent1"/>
+              </a:fillRef>
+              <a:effectRef idx="0">
+                <a:schemeClr val="accent1"/>
+              </a:effectRef>
+              <a:fontRef idx="minor">
+                <a:schemeClr val="lt1"/>
+              </a:fontRef>
+            </p:style>
+            <p:txBody>
+              <a:bodyPr rtlCol="0" anchor="ctr"/>
+              <a:lstStyle/>
+              <a:p>
+                <a:pPr algn="ctr"/>
+                <a:r>
+                  <a:rPr lang="en-US" altLang="zh-CN" dirty="0" smtClean="0"/>
+                  <a:t>Recipe ID</a:t>
+                </a:r>
+                <a:endParaRPr lang="zh-CN" altLang="en-US" dirty="0"/>
+              </a:p>
+            </p:txBody>
+          </p:sp>
+          <p:sp>
+            <p:nvSpPr>
+              <p:cNvPr id="66" name="椭圆 65"/>
+              <p:cNvSpPr/>
+              <p:nvPr/>
+            </p:nvSpPr>
+            <p:spPr>
+              <a:xfrm>
+                <a:off x="3126376" y="246859"/>
+                <a:ext cx="1391197" cy="443043"/>
+              </a:xfrm>
+              <a:prstGeom prst="ellipse">
+                <a:avLst/>
+              </a:prstGeom>
+            </p:spPr>
+            <p:style>
+              <a:lnRef idx="2">
+                <a:schemeClr val="accent1">
+                  <a:shade val="50000"/>
+                </a:schemeClr>
+              </a:lnRef>
+              <a:fillRef idx="1">
+                <a:schemeClr val="accent1"/>
+              </a:fillRef>
+              <a:effectRef idx="0">
+                <a:schemeClr val="accent1"/>
+              </a:effectRef>
+              <a:fontRef idx="minor">
+                <a:schemeClr val="lt1"/>
+              </a:fontRef>
+            </p:style>
+            <p:txBody>
+              <a:bodyPr rtlCol="0" anchor="ctr"/>
+              <a:lstStyle/>
+              <a:p>
+                <a:pPr algn="ctr"/>
+                <a:r>
+                  <a:rPr lang="en-US" altLang="zh-CN" dirty="0" smtClean="0"/>
+                  <a:t>quantity</a:t>
+                </a:r>
+                <a:endParaRPr lang="zh-CN" altLang="en-US" dirty="0"/>
+              </a:p>
+            </p:txBody>
+          </p:sp>
+          <p:sp>
+            <p:nvSpPr>
+              <p:cNvPr id="67" name="椭圆 66"/>
+              <p:cNvSpPr/>
+              <p:nvPr/>
+            </p:nvSpPr>
+            <p:spPr>
+              <a:xfrm>
+                <a:off x="4283083" y="1533917"/>
+                <a:ext cx="1391197" cy="443043"/>
+              </a:xfrm>
+              <a:prstGeom prst="ellipse">
+                <a:avLst/>
+              </a:prstGeom>
+            </p:spPr>
+            <p:style>
+              <a:lnRef idx="2">
+                <a:schemeClr val="accent1">
+                  <a:shade val="50000"/>
+                </a:schemeClr>
+              </a:lnRef>
+              <a:fillRef idx="1">
+                <a:schemeClr val="accent1"/>
+              </a:fillRef>
+              <a:effectRef idx="0">
+                <a:schemeClr val="accent1"/>
+              </a:effectRef>
+              <a:fontRef idx="minor">
+                <a:schemeClr val="lt1"/>
+              </a:fontRef>
+            </p:style>
+            <p:txBody>
+              <a:bodyPr rtlCol="0" anchor="ctr"/>
+              <a:lstStyle/>
+              <a:p>
+                <a:pPr algn="ctr"/>
+                <a:r>
+                  <a:rPr lang="en-US" altLang="zh-CN" dirty="0" smtClean="0"/>
+                  <a:t>unit</a:t>
+                </a:r>
+                <a:endParaRPr lang="zh-CN" altLang="en-US" dirty="0"/>
+              </a:p>
+            </p:txBody>
+          </p:sp>
+          <p:cxnSp>
+            <p:nvCxnSpPr>
+              <p:cNvPr id="69" name="直接连接符 68"/>
+              <p:cNvCxnSpPr>
+                <a:stCxn id="63" idx="5"/>
+                <a:endCxn id="11" idx="0"/>
+              </p:cNvCxnSpPr>
+              <p:nvPr/>
+            </p:nvCxnSpPr>
+            <p:spPr>
+              <a:xfrm>
+                <a:off x="2280660" y="569750"/>
+                <a:ext cx="610588" cy="699521"/>
+              </a:xfrm>
+              <a:prstGeom prst="line">
+                <a:avLst/>
+              </a:prstGeom>
+            </p:spPr>
+            <p:style>
+              <a:lnRef idx="1">
+                <a:schemeClr val="accent1"/>
+              </a:lnRef>
+              <a:fillRef idx="0">
+                <a:schemeClr val="accent1"/>
+              </a:fillRef>
+              <a:effectRef idx="0">
+                <a:schemeClr val="accent1"/>
+              </a:effectRef>
+              <a:fontRef idx="minor">
+                <a:schemeClr val="tx1"/>
+              </a:fontRef>
+            </p:style>
+          </p:cxnSp>
+          <p:cxnSp>
+            <p:nvCxnSpPr>
+              <p:cNvPr id="76" name="直接连接符 75"/>
+              <p:cNvCxnSpPr>
+                <a:stCxn id="11" idx="1"/>
+                <a:endCxn id="65" idx="7"/>
+              </p:cNvCxnSpPr>
+              <p:nvPr/>
+            </p:nvCxnSpPr>
+            <p:spPr>
+              <a:xfrm flipH="1">
+                <a:off x="1606835" y="1526175"/>
+                <a:ext cx="674813" cy="229264"/>
+              </a:xfrm>
+              <a:prstGeom prst="line">
+                <a:avLst/>
+              </a:prstGeom>
+            </p:spPr>
+            <p:style>
+              <a:lnRef idx="1">
+                <a:schemeClr val="accent1"/>
+              </a:lnRef>
+              <a:fillRef idx="0">
+                <a:schemeClr val="accent1"/>
+              </a:fillRef>
+              <a:effectRef idx="0">
+                <a:schemeClr val="accent1"/>
+              </a:effectRef>
+              <a:fontRef idx="minor">
+                <a:schemeClr val="tx1"/>
+              </a:fontRef>
+            </p:style>
+          </p:cxnSp>
+          <p:cxnSp>
+            <p:nvCxnSpPr>
+              <p:cNvPr id="78" name="直接连接符 77"/>
+              <p:cNvCxnSpPr>
+                <a:stCxn id="11" idx="1"/>
+                <a:endCxn id="64" idx="5"/>
+              </p:cNvCxnSpPr>
+              <p:nvPr/>
+            </p:nvCxnSpPr>
+            <p:spPr>
+              <a:xfrm flipH="1" flipV="1">
+                <a:off x="1415166" y="1239223"/>
+                <a:ext cx="866481" cy="286952"/>
+              </a:xfrm>
+              <a:prstGeom prst="line">
+                <a:avLst/>
+              </a:prstGeom>
+            </p:spPr>
+            <p:style>
+              <a:lnRef idx="1">
+                <a:schemeClr val="accent1"/>
+              </a:lnRef>
+              <a:fillRef idx="0">
+                <a:schemeClr val="accent1"/>
+              </a:fillRef>
+              <a:effectRef idx="0">
+                <a:schemeClr val="accent1"/>
+              </a:effectRef>
+              <a:fontRef idx="minor">
+                <a:schemeClr val="tx1"/>
+              </a:fontRef>
+            </p:style>
+          </p:cxnSp>
+          <p:cxnSp>
+            <p:nvCxnSpPr>
+              <p:cNvPr id="80" name="直接连接符 79"/>
+              <p:cNvCxnSpPr>
+                <a:stCxn id="66" idx="4"/>
+                <a:endCxn id="11" idx="3"/>
+              </p:cNvCxnSpPr>
+              <p:nvPr/>
+            </p:nvCxnSpPr>
+            <p:spPr>
+              <a:xfrm flipH="1">
+                <a:off x="3500847" y="689902"/>
+                <a:ext cx="321127" cy="836273"/>
+              </a:xfrm>
+              <a:prstGeom prst="line">
+                <a:avLst/>
+              </a:prstGeom>
+            </p:spPr>
+            <p:style>
+              <a:lnRef idx="1">
+                <a:schemeClr val="accent1"/>
+              </a:lnRef>
+              <a:fillRef idx="0">
+                <a:schemeClr val="accent1"/>
+              </a:fillRef>
+              <a:effectRef idx="0">
+                <a:schemeClr val="accent1"/>
+              </a:effectRef>
+              <a:fontRef idx="minor">
+                <a:schemeClr val="tx1"/>
+              </a:fontRef>
+            </p:style>
+          </p:cxnSp>
+          <p:cxnSp>
+            <p:nvCxnSpPr>
+              <p:cNvPr id="82" name="直接连接符 81"/>
+              <p:cNvCxnSpPr>
+                <a:stCxn id="67" idx="2"/>
+                <a:endCxn id="11" idx="3"/>
+              </p:cNvCxnSpPr>
+              <p:nvPr/>
+            </p:nvCxnSpPr>
+            <p:spPr>
+              <a:xfrm flipH="1" flipV="1">
+                <a:off x="3500847" y="1526175"/>
+                <a:ext cx="782236" cy="229264"/>
+              </a:xfrm>
+              <a:prstGeom prst="line">
+                <a:avLst/>
+              </a:prstGeom>
+            </p:spPr>
+            <p:style>
+              <a:lnRef idx="1">
+                <a:schemeClr val="accent1"/>
+              </a:lnRef>
+              <a:fillRef idx="0">
+                <a:schemeClr val="accent1"/>
+              </a:fillRef>
+              <a:effectRef idx="0">
+                <a:schemeClr val="accent1"/>
+              </a:effectRef>
+              <a:fontRef idx="minor">
+                <a:schemeClr val="tx1"/>
+              </a:fontRef>
+            </p:style>
+          </p:cxnSp>
+        </p:grpSp>
+        <p:sp>
+          <p:nvSpPr>
+            <p:cNvPr id="77" name="椭圆 76"/>
+            <p:cNvSpPr/>
+            <p:nvPr/>
+          </p:nvSpPr>
+          <p:spPr>
+            <a:xfrm>
+              <a:off x="4006623" y="560613"/>
+              <a:ext cx="1762402" cy="314834"/>
+            </a:xfrm>
+            <a:prstGeom prst="ellipse">
+              <a:avLst/>
+            </a:prstGeom>
+          </p:spPr>
+          <p:style>
+            <a:lnRef idx="2">
+              <a:schemeClr val="accent1">
+                <a:shade val="50000"/>
+              </a:schemeClr>
+            </a:lnRef>
+            <a:fillRef idx="1">
+              <a:schemeClr val="accent1"/>
+            </a:fillRef>
+            <a:effectRef idx="0">
+              <a:schemeClr val="accent1"/>
+            </a:effectRef>
+            <a:fontRef idx="minor">
+              <a:schemeClr val="lt1"/>
+            </a:fontRef>
+          </p:style>
+          <p:txBody>
+            <a:bodyPr rtlCol="0" anchor="ctr"/>
+            <a:lstStyle/>
+            <a:p>
+              <a:pPr algn="ctr"/>
+              <a:r>
+                <a:rPr lang="en-US" altLang="zh-CN" dirty="0" smtClean="0"/>
+                <a:t>comments</a:t>
+              </a:r>
+              <a:endParaRPr lang="zh-CN" altLang="en-US" dirty="0"/>
+            </a:p>
+          </p:txBody>
+        </p:sp>
+        <p:cxnSp>
+          <p:nvCxnSpPr>
+            <p:cNvPr id="79" name="直接连接符 78"/>
+            <p:cNvCxnSpPr>
+              <a:stCxn id="77" idx="2"/>
+              <a:endCxn id="11" idx="3"/>
+            </p:cNvCxnSpPr>
+            <p:nvPr/>
+          </p:nvCxnSpPr>
+          <p:spPr>
+            <a:xfrm flipH="1">
+              <a:off x="3173873" y="718030"/>
+              <a:ext cx="832750" cy="421939"/>
+            </a:xfrm>
+            <a:prstGeom prst="line">
+              <a:avLst/>
+            </a:prstGeom>
+          </p:spPr>
+          <p:style>
+            <a:lnRef idx="1">
+              <a:schemeClr val="accent1"/>
+            </a:lnRef>
+            <a:fillRef idx="0">
+              <a:schemeClr val="accent1"/>
+            </a:fillRef>
+            <a:effectRef idx="0">
+              <a:schemeClr val="accent1"/>
+            </a:effectRef>
+            <a:fontRef idx="minor">
+              <a:schemeClr val="tx1"/>
+            </a:fontRef>
+          </p:style>
+        </p:cxnSp>
+      </p:grpSp>
     </p:spTree>
     <p:extLst>
       <p:ext uri="{BB962C8B-B14F-4D97-AF65-F5344CB8AC3E}">

</xml_diff>

<commit_message>
alter the database table.
</commit_message>
<xml_diff>
--- a/design/E-R Diagram.pptx
+++ b/design/E-R Diagram.pptx
@@ -243,7 +243,7 @@
           <a:p>
             <a:fld id="{E766C5E8-0AAF-4497-91D2-AC309810ED9A}" type="datetimeFigureOut">
               <a:rPr lang="zh-CN" altLang="en-US" smtClean="0"/>
-              <a:t>2018/5/23</a:t>
+              <a:t>2018/5/25</a:t>
             </a:fld>
             <a:endParaRPr lang="zh-CN" altLang="en-US"/>
           </a:p>
@@ -413,7 +413,7 @@
           <a:p>
             <a:fld id="{E766C5E8-0AAF-4497-91D2-AC309810ED9A}" type="datetimeFigureOut">
               <a:rPr lang="zh-CN" altLang="en-US" smtClean="0"/>
-              <a:t>2018/5/23</a:t>
+              <a:t>2018/5/25</a:t>
             </a:fld>
             <a:endParaRPr lang="zh-CN" altLang="en-US"/>
           </a:p>
@@ -593,7 +593,7 @@
           <a:p>
             <a:fld id="{E766C5E8-0AAF-4497-91D2-AC309810ED9A}" type="datetimeFigureOut">
               <a:rPr lang="zh-CN" altLang="en-US" smtClean="0"/>
-              <a:t>2018/5/23</a:t>
+              <a:t>2018/5/25</a:t>
             </a:fld>
             <a:endParaRPr lang="zh-CN" altLang="en-US"/>
           </a:p>
@@ -763,7 +763,7 @@
           <a:p>
             <a:fld id="{E766C5E8-0AAF-4497-91D2-AC309810ED9A}" type="datetimeFigureOut">
               <a:rPr lang="zh-CN" altLang="en-US" smtClean="0"/>
-              <a:t>2018/5/23</a:t>
+              <a:t>2018/5/25</a:t>
             </a:fld>
             <a:endParaRPr lang="zh-CN" altLang="en-US"/>
           </a:p>
@@ -1009,7 +1009,7 @@
           <a:p>
             <a:fld id="{E766C5E8-0AAF-4497-91D2-AC309810ED9A}" type="datetimeFigureOut">
               <a:rPr lang="zh-CN" altLang="en-US" smtClean="0"/>
-              <a:t>2018/5/23</a:t>
+              <a:t>2018/5/25</a:t>
             </a:fld>
             <a:endParaRPr lang="zh-CN" altLang="en-US"/>
           </a:p>
@@ -1241,7 +1241,7 @@
           <a:p>
             <a:fld id="{E766C5E8-0AAF-4497-91D2-AC309810ED9A}" type="datetimeFigureOut">
               <a:rPr lang="zh-CN" altLang="en-US" smtClean="0"/>
-              <a:t>2018/5/23</a:t>
+              <a:t>2018/5/25</a:t>
             </a:fld>
             <a:endParaRPr lang="zh-CN" altLang="en-US"/>
           </a:p>
@@ -1608,7 +1608,7 @@
           <a:p>
             <a:fld id="{E766C5E8-0AAF-4497-91D2-AC309810ED9A}" type="datetimeFigureOut">
               <a:rPr lang="zh-CN" altLang="en-US" smtClean="0"/>
-              <a:t>2018/5/23</a:t>
+              <a:t>2018/5/25</a:t>
             </a:fld>
             <a:endParaRPr lang="zh-CN" altLang="en-US"/>
           </a:p>
@@ -1726,7 +1726,7 @@
           <a:p>
             <a:fld id="{E766C5E8-0AAF-4497-91D2-AC309810ED9A}" type="datetimeFigureOut">
               <a:rPr lang="zh-CN" altLang="en-US" smtClean="0"/>
-              <a:t>2018/5/23</a:t>
+              <a:t>2018/5/25</a:t>
             </a:fld>
             <a:endParaRPr lang="zh-CN" altLang="en-US"/>
           </a:p>
@@ -1821,7 +1821,7 @@
           <a:p>
             <a:fld id="{E766C5E8-0AAF-4497-91D2-AC309810ED9A}" type="datetimeFigureOut">
               <a:rPr lang="zh-CN" altLang="en-US" smtClean="0"/>
-              <a:t>2018/5/23</a:t>
+              <a:t>2018/5/25</a:t>
             </a:fld>
             <a:endParaRPr lang="zh-CN" altLang="en-US"/>
           </a:p>
@@ -2098,7 +2098,7 @@
           <a:p>
             <a:fld id="{E766C5E8-0AAF-4497-91D2-AC309810ED9A}" type="datetimeFigureOut">
               <a:rPr lang="zh-CN" altLang="en-US" smtClean="0"/>
-              <a:t>2018/5/23</a:t>
+              <a:t>2018/5/25</a:t>
             </a:fld>
             <a:endParaRPr lang="zh-CN" altLang="en-US"/>
           </a:p>
@@ -2351,7 +2351,7 @@
           <a:p>
             <a:fld id="{E766C5E8-0AAF-4497-91D2-AC309810ED9A}" type="datetimeFigureOut">
               <a:rPr lang="zh-CN" altLang="en-US" smtClean="0"/>
-              <a:t>2018/5/23</a:t>
+              <a:t>2018/5/25</a:t>
             </a:fld>
             <a:endParaRPr lang="zh-CN" altLang="en-US"/>
           </a:p>
@@ -2564,7 +2564,7 @@
           <a:p>
             <a:fld id="{E766C5E8-0AAF-4497-91D2-AC309810ED9A}" type="datetimeFigureOut">
               <a:rPr lang="zh-CN" altLang="en-US" smtClean="0"/>
-              <a:t>2018/5/23</a:t>
+              <a:t>2018/5/25</a:t>
             </a:fld>
             <a:endParaRPr lang="zh-CN" altLang="en-US"/>
           </a:p>
@@ -2997,6 +2997,11 @@
             <a:prstGeom prst="roundRect">
               <a:avLst/>
             </a:prstGeom>
+            <a:solidFill>
+              <a:schemeClr val="bg2">
+                <a:lumMod val="25000"/>
+              </a:schemeClr>
+            </a:solidFill>
           </p:spPr>
           <p:style>
             <a:lnRef idx="2">
@@ -3212,13 +3217,14 @@
             <p:cNvPr id="18" name="直接连接符 17"/>
             <p:cNvCxnSpPr>
               <a:stCxn id="12" idx="5"/>
+              <a:endCxn id="8" idx="0"/>
             </p:cNvCxnSpPr>
             <p:nvPr/>
           </p:nvCxnSpPr>
           <p:spPr>
             <a:xfrm>
-              <a:off x="7502436" y="879564"/>
-              <a:ext cx="914400" cy="914400"/>
+              <a:off x="7531399" y="884410"/>
+              <a:ext cx="567572" cy="800699"/>
             </a:xfrm>
             <a:prstGeom prst="line">
               <a:avLst/>
@@ -3242,13 +3248,15 @@
         <p:cxnSp>
           <p:nvCxnSpPr>
             <p:cNvPr id="19" name="直接连接符 18"/>
-            <p:cNvCxnSpPr/>
+            <p:cNvCxnSpPr>
+              <a:endCxn id="8" idx="0"/>
+            </p:cNvCxnSpPr>
             <p:nvPr/>
           </p:nvCxnSpPr>
           <p:spPr>
             <a:xfrm flipH="1">
-              <a:off x="8338457" y="936172"/>
-              <a:ext cx="431074" cy="1071154"/>
+              <a:off x="8098971" y="936172"/>
+              <a:ext cx="670562" cy="748937"/>
             </a:xfrm>
             <a:prstGeom prst="line">
               <a:avLst/>
@@ -3274,13 +3282,14 @@
             <p:cNvPr id="21" name="直接连接符 20"/>
             <p:cNvCxnSpPr>
               <a:stCxn id="15" idx="2"/>
+              <a:endCxn id="8" idx="0"/>
             </p:cNvCxnSpPr>
             <p:nvPr/>
           </p:nvCxnSpPr>
           <p:spPr>
             <a:xfrm flipH="1">
-              <a:off x="8255724" y="1334587"/>
-              <a:ext cx="1606731" cy="657498"/>
+              <a:off x="8098971" y="1334587"/>
+              <a:ext cx="1763484" cy="350522"/>
             </a:xfrm>
             <a:prstGeom prst="line">
               <a:avLst/>
@@ -3304,13 +3313,15 @@
         <p:cxnSp>
           <p:nvCxnSpPr>
             <p:cNvPr id="23" name="直接连接符 22"/>
-            <p:cNvCxnSpPr/>
+            <p:cNvCxnSpPr>
+              <a:stCxn id="14" idx="2"/>
+            </p:cNvCxnSpPr>
             <p:nvPr/>
           </p:nvCxnSpPr>
           <p:spPr>
             <a:xfrm flipH="1" flipV="1">
-              <a:off x="8338457" y="2007326"/>
-              <a:ext cx="2495006" cy="117565"/>
+              <a:off x="8708679" y="1955072"/>
+              <a:ext cx="1454222" cy="178529"/>
             </a:xfrm>
             <a:prstGeom prst="line">
               <a:avLst/>
@@ -3332,373 +3343,6 @@
           </p:style>
         </p:cxnSp>
       </p:grpSp>
-      <p:grpSp>
-        <p:nvGrpSpPr>
-          <p:cNvPr id="97" name="组合 96"/>
-          <p:cNvGrpSpPr/>
-          <p:nvPr/>
-        </p:nvGrpSpPr>
-        <p:grpSpPr>
-          <a:xfrm>
-            <a:off x="8416836" y="3869376"/>
-            <a:ext cx="3394164" cy="2388501"/>
-            <a:chOff x="8416836" y="3869376"/>
-            <a:chExt cx="3394164" cy="2388501"/>
-          </a:xfrm>
-        </p:grpSpPr>
-        <p:sp>
-          <p:nvSpPr>
-            <p:cNvPr id="9" name="圆角矩形 8"/>
-            <p:cNvSpPr/>
-            <p:nvPr/>
-          </p:nvSpPr>
-          <p:spPr>
-            <a:xfrm>
-              <a:off x="8643255" y="4659084"/>
-              <a:ext cx="1219200" cy="513805"/>
-            </a:xfrm>
-            <a:prstGeom prst="roundRect">
-              <a:avLst/>
-            </a:prstGeom>
-          </p:spPr>
-          <p:style>
-            <a:lnRef idx="2">
-              <a:schemeClr val="accent1">
-                <a:shade val="50000"/>
-              </a:schemeClr>
-            </a:lnRef>
-            <a:fillRef idx="1">
-              <a:schemeClr val="accent1"/>
-            </a:fillRef>
-            <a:effectRef idx="0">
-              <a:schemeClr val="accent1"/>
-            </a:effectRef>
-            <a:fontRef idx="minor">
-              <a:schemeClr val="lt1"/>
-            </a:fontRef>
-          </p:style>
-          <p:txBody>
-            <a:bodyPr rtlCol="0" anchor="ctr"/>
-            <a:lstStyle/>
-            <a:p>
-              <a:pPr algn="ctr"/>
-              <a:r>
-                <a:rPr lang="en-US" altLang="zh-CN" dirty="0" smtClean="0"/>
-                <a:t>Step</a:t>
-              </a:r>
-              <a:endParaRPr lang="zh-CN" altLang="en-US" dirty="0"/>
-            </a:p>
-          </p:txBody>
-        </p:sp>
-        <p:sp>
-          <p:nvSpPr>
-            <p:cNvPr id="85" name="椭圆 84"/>
-            <p:cNvSpPr/>
-            <p:nvPr/>
-          </p:nvSpPr>
-          <p:spPr>
-            <a:xfrm>
-              <a:off x="10417628" y="3869376"/>
-              <a:ext cx="1293224" cy="443043"/>
-            </a:xfrm>
-            <a:prstGeom prst="ellipse">
-              <a:avLst/>
-            </a:prstGeom>
-          </p:spPr>
-          <p:style>
-            <a:lnRef idx="2">
-              <a:schemeClr val="accent1">
-                <a:shade val="50000"/>
-              </a:schemeClr>
-            </a:lnRef>
-            <a:fillRef idx="1">
-              <a:schemeClr val="accent1"/>
-            </a:fillRef>
-            <a:effectRef idx="0">
-              <a:schemeClr val="accent1"/>
-            </a:effectRef>
-            <a:fontRef idx="minor">
-              <a:schemeClr val="lt1"/>
-            </a:fontRef>
-          </p:style>
-          <p:txBody>
-            <a:bodyPr rtlCol="0" anchor="ctr"/>
-            <a:lstStyle/>
-            <a:p>
-              <a:pPr algn="ctr"/>
-              <a:r>
-                <a:rPr lang="en-US" altLang="zh-CN" dirty="0" smtClean="0"/>
-                <a:t>stepID</a:t>
-              </a:r>
-              <a:endParaRPr lang="zh-CN" altLang="en-US" dirty="0"/>
-            </a:p>
-          </p:txBody>
-        </p:sp>
-        <p:sp>
-          <p:nvSpPr>
-            <p:cNvPr id="86" name="椭圆 85"/>
-            <p:cNvSpPr/>
-            <p:nvPr/>
-          </p:nvSpPr>
-          <p:spPr>
-            <a:xfrm>
-              <a:off x="10517776" y="4843498"/>
-              <a:ext cx="1293224" cy="443043"/>
-            </a:xfrm>
-            <a:prstGeom prst="ellipse">
-              <a:avLst/>
-            </a:prstGeom>
-          </p:spPr>
-          <p:style>
-            <a:lnRef idx="2">
-              <a:schemeClr val="accent1">
-                <a:shade val="50000"/>
-              </a:schemeClr>
-            </a:lnRef>
-            <a:fillRef idx="1">
-              <a:schemeClr val="accent1"/>
-            </a:fillRef>
-            <a:effectRef idx="0">
-              <a:schemeClr val="accent1"/>
-            </a:effectRef>
-            <a:fontRef idx="minor">
-              <a:schemeClr val="lt1"/>
-            </a:fontRef>
-          </p:style>
-          <p:txBody>
-            <a:bodyPr rtlCol="0" anchor="ctr"/>
-            <a:lstStyle/>
-            <a:p>
-              <a:pPr algn="ctr"/>
-              <a:r>
-                <a:rPr lang="en-US" altLang="zh-CN" dirty="0" smtClean="0"/>
-                <a:t>content</a:t>
-              </a:r>
-              <a:endParaRPr lang="zh-CN" altLang="en-US" dirty="0"/>
-            </a:p>
-          </p:txBody>
-        </p:sp>
-        <p:sp>
-          <p:nvSpPr>
-            <p:cNvPr id="87" name="椭圆 86"/>
-            <p:cNvSpPr/>
-            <p:nvPr/>
-          </p:nvSpPr>
-          <p:spPr>
-            <a:xfrm>
-              <a:off x="9989819" y="5814834"/>
-              <a:ext cx="1687288" cy="443043"/>
-            </a:xfrm>
-            <a:prstGeom prst="ellipse">
-              <a:avLst/>
-            </a:prstGeom>
-          </p:spPr>
-          <p:style>
-            <a:lnRef idx="2">
-              <a:schemeClr val="accent1">
-                <a:shade val="50000"/>
-              </a:schemeClr>
-            </a:lnRef>
-            <a:fillRef idx="1">
-              <a:schemeClr val="accent1"/>
-            </a:fillRef>
-            <a:effectRef idx="0">
-              <a:schemeClr val="accent1"/>
-            </a:effectRef>
-            <a:fontRef idx="minor">
-              <a:schemeClr val="lt1"/>
-            </a:fontRef>
-          </p:style>
-          <p:txBody>
-            <a:bodyPr rtlCol="0" anchor="ctr"/>
-            <a:lstStyle/>
-            <a:p>
-              <a:pPr algn="ctr"/>
-              <a:r>
-                <a:rPr lang="en-US" altLang="zh-CN" dirty="0" smtClean="0"/>
-                <a:t>recipeID</a:t>
-              </a:r>
-              <a:endParaRPr lang="zh-CN" altLang="en-US" dirty="0"/>
-            </a:p>
-          </p:txBody>
-        </p:sp>
-        <p:sp>
-          <p:nvSpPr>
-            <p:cNvPr id="88" name="椭圆 87"/>
-            <p:cNvSpPr/>
-            <p:nvPr/>
-          </p:nvSpPr>
-          <p:spPr>
-            <a:xfrm>
-              <a:off x="8416836" y="5814833"/>
-              <a:ext cx="1293224" cy="443043"/>
-            </a:xfrm>
-            <a:prstGeom prst="ellipse">
-              <a:avLst/>
-            </a:prstGeom>
-          </p:spPr>
-          <p:style>
-            <a:lnRef idx="2">
-              <a:schemeClr val="accent1">
-                <a:shade val="50000"/>
-              </a:schemeClr>
-            </a:lnRef>
-            <a:fillRef idx="1">
-              <a:schemeClr val="accent1"/>
-            </a:fillRef>
-            <a:effectRef idx="0">
-              <a:schemeClr val="accent1"/>
-            </a:effectRef>
-            <a:fontRef idx="minor">
-              <a:schemeClr val="lt1"/>
-            </a:fontRef>
-          </p:style>
-          <p:txBody>
-            <a:bodyPr rtlCol="0" anchor="ctr"/>
-            <a:lstStyle/>
-            <a:p>
-              <a:pPr algn="ctr"/>
-              <a:r>
-                <a:rPr lang="en-US" altLang="zh-CN" dirty="0" smtClean="0"/>
-                <a:t>order</a:t>
-              </a:r>
-              <a:endParaRPr lang="zh-CN" altLang="en-US" dirty="0"/>
-            </a:p>
-          </p:txBody>
-        </p:sp>
-        <p:cxnSp>
-          <p:nvCxnSpPr>
-            <p:cNvPr id="90" name="直接连接符 89"/>
-            <p:cNvCxnSpPr>
-              <a:stCxn id="9" idx="2"/>
-              <a:endCxn id="87" idx="0"/>
-            </p:cNvCxnSpPr>
-            <p:nvPr/>
-          </p:nvCxnSpPr>
-          <p:spPr>
-            <a:xfrm>
-              <a:off x="9252855" y="5172889"/>
-              <a:ext cx="1580608" cy="641945"/>
-            </a:xfrm>
-            <a:prstGeom prst="line">
-              <a:avLst/>
-            </a:prstGeom>
-          </p:spPr>
-          <p:style>
-            <a:lnRef idx="1">
-              <a:schemeClr val="accent1"/>
-            </a:lnRef>
-            <a:fillRef idx="0">
-              <a:schemeClr val="accent1"/>
-            </a:fillRef>
-            <a:effectRef idx="0">
-              <a:schemeClr val="accent1"/>
-            </a:effectRef>
-            <a:fontRef idx="minor">
-              <a:schemeClr val="tx1"/>
-            </a:fontRef>
-          </p:style>
-        </p:cxnSp>
-        <p:cxnSp>
-          <p:nvCxnSpPr>
-            <p:cNvPr id="91" name="直接连接符 90"/>
-            <p:cNvCxnSpPr>
-              <a:stCxn id="9" idx="2"/>
-              <a:endCxn id="88" idx="0"/>
-            </p:cNvCxnSpPr>
-            <p:nvPr/>
-          </p:nvCxnSpPr>
-          <p:spPr>
-            <a:xfrm flipH="1">
-              <a:off x="9063448" y="5172889"/>
-              <a:ext cx="189407" cy="641944"/>
-            </a:xfrm>
-            <a:prstGeom prst="line">
-              <a:avLst/>
-            </a:prstGeom>
-          </p:spPr>
-          <p:style>
-            <a:lnRef idx="1">
-              <a:schemeClr val="accent1"/>
-            </a:lnRef>
-            <a:fillRef idx="0">
-              <a:schemeClr val="accent1"/>
-            </a:fillRef>
-            <a:effectRef idx="0">
-              <a:schemeClr val="accent1"/>
-            </a:effectRef>
-            <a:fontRef idx="minor">
-              <a:schemeClr val="tx1"/>
-            </a:fontRef>
-          </p:style>
-        </p:cxnSp>
-        <p:cxnSp>
-          <p:nvCxnSpPr>
-            <p:cNvPr id="93" name="直接连接符 92"/>
-            <p:cNvCxnSpPr>
-              <a:stCxn id="9" idx="0"/>
-              <a:endCxn id="85" idx="3"/>
-            </p:cNvCxnSpPr>
-            <p:nvPr/>
-          </p:nvCxnSpPr>
-          <p:spPr>
-            <a:xfrm flipV="1">
-              <a:off x="9252855" y="4247537"/>
-              <a:ext cx="1354161" cy="411547"/>
-            </a:xfrm>
-            <a:prstGeom prst="line">
-              <a:avLst/>
-            </a:prstGeom>
-          </p:spPr>
-          <p:style>
-            <a:lnRef idx="1">
-              <a:schemeClr val="accent1"/>
-            </a:lnRef>
-            <a:fillRef idx="0">
-              <a:schemeClr val="accent1"/>
-            </a:fillRef>
-            <a:effectRef idx="0">
-              <a:schemeClr val="accent1"/>
-            </a:effectRef>
-            <a:fontRef idx="minor">
-              <a:schemeClr val="tx1"/>
-            </a:fontRef>
-          </p:style>
-        </p:cxnSp>
-        <p:cxnSp>
-          <p:nvCxnSpPr>
-            <p:cNvPr id="95" name="直接连接符 94"/>
-            <p:cNvCxnSpPr>
-              <a:stCxn id="9" idx="3"/>
-              <a:endCxn id="86" idx="2"/>
-            </p:cNvCxnSpPr>
-            <p:nvPr/>
-          </p:nvCxnSpPr>
-          <p:spPr>
-            <a:xfrm>
-              <a:off x="9862455" y="4915987"/>
-              <a:ext cx="655321" cy="149033"/>
-            </a:xfrm>
-            <a:prstGeom prst="line">
-              <a:avLst/>
-            </a:prstGeom>
-          </p:spPr>
-          <p:style>
-            <a:lnRef idx="1">
-              <a:schemeClr val="accent1"/>
-            </a:lnRef>
-            <a:fillRef idx="0">
-              <a:schemeClr val="accent1"/>
-            </a:fillRef>
-            <a:effectRef idx="0">
-              <a:schemeClr val="accent1"/>
-            </a:effectRef>
-            <a:fontRef idx="minor">
-              <a:schemeClr val="tx1"/>
-            </a:fontRef>
-          </p:style>
-        </p:cxnSp>
-      </p:grpSp>
       <p:sp>
         <p:nvSpPr>
           <p:cNvPr id="98" name="流程图: 决策 97"/>
@@ -3713,6 +3357,9 @@
           <a:prstGeom prst="flowChartDecision">
             <a:avLst/>
           </a:prstGeom>
+          <a:solidFill>
+            <a:schemeClr val="accent2"/>
+          </a:solidFill>
         </p:spPr>
         <p:style>
           <a:lnRef idx="2">
@@ -3883,6 +3530,9 @@
           <a:prstGeom prst="flowChartDecision">
             <a:avLst/>
           </a:prstGeom>
+          <a:solidFill>
+            <a:schemeClr val="accent2"/>
+          </a:solidFill>
         </p:spPr>
         <p:style>
           <a:lnRef idx="2">
@@ -4053,6 +3703,9 @@
           <a:prstGeom prst="flowChartDecision">
             <a:avLst/>
           </a:prstGeom>
+          <a:solidFill>
+            <a:schemeClr val="accent2"/>
+          </a:solidFill>
         </p:spPr>
         <p:style>
           <a:lnRef idx="2">
@@ -4530,6 +4183,12 @@
               <a:prstGeom prst="roundRect">
                 <a:avLst/>
               </a:prstGeom>
+              <a:solidFill>
+                <a:schemeClr val="tx1">
+                  <a:lumMod val="75000"/>
+                  <a:lumOff val="25000"/>
+                </a:schemeClr>
+              </a:solidFill>
             </p:spPr>
             <p:style>
               <a:lnRef idx="2">
@@ -5180,44 +4839,494 @@
       </p:grpSp>
       <p:grpSp>
         <p:nvGrpSpPr>
-          <p:cNvPr id="13" name="组合 12"/>
+          <p:cNvPr id="4" name="组合 3"/>
           <p:cNvGrpSpPr/>
           <p:nvPr/>
         </p:nvGrpSpPr>
         <p:grpSpPr>
           <a:xfrm>
             <a:off x="0" y="191589"/>
-            <a:ext cx="5769025" cy="1380027"/>
+            <a:ext cx="5769025" cy="1942521"/>
             <a:chOff x="0" y="191589"/>
-            <a:chExt cx="5769025" cy="1380027"/>
+            <a:chExt cx="5769025" cy="1942521"/>
           </a:xfrm>
         </p:grpSpPr>
         <p:grpSp>
           <p:nvGrpSpPr>
-            <p:cNvPr id="84" name="组合 83"/>
+            <p:cNvPr id="13" name="组合 12"/>
             <p:cNvGrpSpPr/>
             <p:nvPr/>
           </p:nvGrpSpPr>
           <p:grpSpPr>
             <a:xfrm>
               <a:off x="0" y="191589"/>
-              <a:ext cx="5323441" cy="1380027"/>
-              <a:chOff x="291738" y="191589"/>
-              <a:chExt cx="5382542" cy="1942011"/>
+              <a:ext cx="5769025" cy="1380027"/>
+              <a:chOff x="0" y="191589"/>
+              <a:chExt cx="5769025" cy="1380027"/>
             </a:xfrm>
           </p:grpSpPr>
+          <p:grpSp>
+            <p:nvGrpSpPr>
+              <p:cNvPr id="84" name="组合 83"/>
+              <p:cNvGrpSpPr/>
+              <p:nvPr/>
+            </p:nvGrpSpPr>
+            <p:grpSpPr>
+              <a:xfrm>
+                <a:off x="0" y="191589"/>
+                <a:ext cx="5323441" cy="1380027"/>
+                <a:chOff x="291738" y="191589"/>
+                <a:chExt cx="5382542" cy="1942011"/>
+              </a:xfrm>
+            </p:grpSpPr>
+            <p:sp>
+              <p:nvSpPr>
+                <p:cNvPr id="11" name="圆角矩形 10"/>
+                <p:cNvSpPr/>
+                <p:nvPr/>
+              </p:nvSpPr>
+              <p:spPr>
+                <a:xfrm>
+                  <a:off x="2281647" y="1269272"/>
+                  <a:ext cx="1219200" cy="513805"/>
+                </a:xfrm>
+                <a:prstGeom prst="roundRect">
+                  <a:avLst/>
+                </a:prstGeom>
+                <a:solidFill>
+                  <a:schemeClr val="tx1">
+                    <a:lumMod val="75000"/>
+                    <a:lumOff val="25000"/>
+                  </a:schemeClr>
+                </a:solidFill>
+              </p:spPr>
+              <p:style>
+                <a:lnRef idx="2">
+                  <a:schemeClr val="accent1">
+                    <a:shade val="50000"/>
+                  </a:schemeClr>
+                </a:lnRef>
+                <a:fillRef idx="1">
+                  <a:schemeClr val="accent1"/>
+                </a:fillRef>
+                <a:effectRef idx="0">
+                  <a:schemeClr val="accent1"/>
+                </a:effectRef>
+                <a:fontRef idx="minor">
+                  <a:schemeClr val="lt1"/>
+                </a:fontRef>
+              </p:style>
+              <p:txBody>
+                <a:bodyPr rtlCol="0" anchor="ctr"/>
+                <a:lstStyle/>
+                <a:p>
+                  <a:pPr algn="ctr"/>
+                  <a:r>
+                    <a:rPr lang="en-US" altLang="zh-CN" dirty="0" smtClean="0"/>
+                    <a:t>Ingredient</a:t>
+                  </a:r>
+                  <a:endParaRPr lang="zh-CN" altLang="en-US" dirty="0"/>
+                </a:p>
+              </p:txBody>
+            </p:sp>
+            <p:sp>
+              <p:nvSpPr>
+                <p:cNvPr id="63" name="椭圆 62"/>
+                <p:cNvSpPr/>
+                <p:nvPr/>
+              </p:nvSpPr>
+              <p:spPr>
+                <a:xfrm>
+                  <a:off x="599921" y="191589"/>
+                  <a:ext cx="1969108" cy="443043"/>
+                </a:xfrm>
+                <a:prstGeom prst="ellipse">
+                  <a:avLst/>
+                </a:prstGeom>
+              </p:spPr>
+              <p:style>
+                <a:lnRef idx="2">
+                  <a:schemeClr val="accent1">
+                    <a:shade val="50000"/>
+                  </a:schemeClr>
+                </a:lnRef>
+                <a:fillRef idx="1">
+                  <a:schemeClr val="accent1"/>
+                </a:fillRef>
+                <a:effectRef idx="0">
+                  <a:schemeClr val="accent1"/>
+                </a:effectRef>
+                <a:fontRef idx="minor">
+                  <a:schemeClr val="lt1"/>
+                </a:fontRef>
+              </p:style>
+              <p:txBody>
+                <a:bodyPr rtlCol="0" anchor="ctr"/>
+                <a:lstStyle/>
+                <a:p>
+                  <a:pPr algn="ctr"/>
+                  <a:r>
+                    <a:rPr lang="en-US" altLang="zh-CN" dirty="0" smtClean="0"/>
+                    <a:t>ingredientID</a:t>
+                  </a:r>
+                  <a:endParaRPr lang="zh-CN" altLang="en-US" dirty="0"/>
+                </a:p>
+              </p:txBody>
+            </p:sp>
+            <p:sp>
+              <p:nvSpPr>
+                <p:cNvPr id="64" name="椭圆 63"/>
+                <p:cNvSpPr/>
+                <p:nvPr/>
+              </p:nvSpPr>
+              <p:spPr>
+                <a:xfrm>
+                  <a:off x="311331" y="861062"/>
+                  <a:ext cx="1293224" cy="443043"/>
+                </a:xfrm>
+                <a:prstGeom prst="ellipse">
+                  <a:avLst/>
+                </a:prstGeom>
+              </p:spPr>
+              <p:style>
+                <a:lnRef idx="2">
+                  <a:schemeClr val="accent1">
+                    <a:shade val="50000"/>
+                  </a:schemeClr>
+                </a:lnRef>
+                <a:fillRef idx="1">
+                  <a:schemeClr val="accent1"/>
+                </a:fillRef>
+                <a:effectRef idx="0">
+                  <a:schemeClr val="accent1"/>
+                </a:effectRef>
+                <a:fontRef idx="minor">
+                  <a:schemeClr val="lt1"/>
+                </a:fontRef>
+              </p:style>
+              <p:txBody>
+                <a:bodyPr rtlCol="0" anchor="ctr"/>
+                <a:lstStyle/>
+                <a:p>
+                  <a:pPr algn="ctr"/>
+                  <a:r>
+                    <a:rPr lang="en-US" altLang="zh-CN" dirty="0" smtClean="0"/>
+                    <a:t>name</a:t>
+                  </a:r>
+                  <a:endParaRPr lang="zh-CN" altLang="en-US" dirty="0"/>
+                </a:p>
+              </p:txBody>
+            </p:sp>
+            <p:sp>
+              <p:nvSpPr>
+                <p:cNvPr id="65" name="椭圆 64"/>
+                <p:cNvSpPr/>
+                <p:nvPr/>
+              </p:nvSpPr>
+              <p:spPr>
+                <a:xfrm>
+                  <a:off x="291738" y="1690557"/>
+                  <a:ext cx="1540732" cy="443043"/>
+                </a:xfrm>
+                <a:prstGeom prst="ellipse">
+                  <a:avLst/>
+                </a:prstGeom>
+              </p:spPr>
+              <p:style>
+                <a:lnRef idx="2">
+                  <a:schemeClr val="accent1">
+                    <a:shade val="50000"/>
+                  </a:schemeClr>
+                </a:lnRef>
+                <a:fillRef idx="1">
+                  <a:schemeClr val="accent1"/>
+                </a:fillRef>
+                <a:effectRef idx="0">
+                  <a:schemeClr val="accent1"/>
+                </a:effectRef>
+                <a:fontRef idx="minor">
+                  <a:schemeClr val="lt1"/>
+                </a:fontRef>
+              </p:style>
+              <p:txBody>
+                <a:bodyPr rtlCol="0" anchor="ctr"/>
+                <a:lstStyle/>
+                <a:p>
+                  <a:pPr algn="ctr"/>
+                  <a:r>
+                    <a:rPr lang="en-US" altLang="zh-CN" dirty="0" smtClean="0"/>
+                    <a:t>Recipe ID</a:t>
+                  </a:r>
+                  <a:endParaRPr lang="zh-CN" altLang="en-US" dirty="0"/>
+                </a:p>
+              </p:txBody>
+            </p:sp>
+            <p:sp>
+              <p:nvSpPr>
+                <p:cNvPr id="66" name="椭圆 65"/>
+                <p:cNvSpPr/>
+                <p:nvPr/>
+              </p:nvSpPr>
+              <p:spPr>
+                <a:xfrm>
+                  <a:off x="3126376" y="246859"/>
+                  <a:ext cx="1391197" cy="443043"/>
+                </a:xfrm>
+                <a:prstGeom prst="ellipse">
+                  <a:avLst/>
+                </a:prstGeom>
+              </p:spPr>
+              <p:style>
+                <a:lnRef idx="2">
+                  <a:schemeClr val="accent1">
+                    <a:shade val="50000"/>
+                  </a:schemeClr>
+                </a:lnRef>
+                <a:fillRef idx="1">
+                  <a:schemeClr val="accent1"/>
+                </a:fillRef>
+                <a:effectRef idx="0">
+                  <a:schemeClr val="accent1"/>
+                </a:effectRef>
+                <a:fontRef idx="minor">
+                  <a:schemeClr val="lt1"/>
+                </a:fontRef>
+              </p:style>
+              <p:txBody>
+                <a:bodyPr rtlCol="0" anchor="ctr"/>
+                <a:lstStyle/>
+                <a:p>
+                  <a:pPr algn="ctr"/>
+                  <a:r>
+                    <a:rPr lang="en-US" altLang="zh-CN" dirty="0" smtClean="0"/>
+                    <a:t>quantity</a:t>
+                  </a:r>
+                  <a:endParaRPr lang="zh-CN" altLang="en-US" dirty="0"/>
+                </a:p>
+              </p:txBody>
+            </p:sp>
+            <p:sp>
+              <p:nvSpPr>
+                <p:cNvPr id="67" name="椭圆 66"/>
+                <p:cNvSpPr/>
+                <p:nvPr/>
+              </p:nvSpPr>
+              <p:spPr>
+                <a:xfrm>
+                  <a:off x="4283083" y="1533917"/>
+                  <a:ext cx="1391197" cy="443043"/>
+                </a:xfrm>
+                <a:prstGeom prst="ellipse">
+                  <a:avLst/>
+                </a:prstGeom>
+              </p:spPr>
+              <p:style>
+                <a:lnRef idx="2">
+                  <a:schemeClr val="accent1">
+                    <a:shade val="50000"/>
+                  </a:schemeClr>
+                </a:lnRef>
+                <a:fillRef idx="1">
+                  <a:schemeClr val="accent1"/>
+                </a:fillRef>
+                <a:effectRef idx="0">
+                  <a:schemeClr val="accent1"/>
+                </a:effectRef>
+                <a:fontRef idx="minor">
+                  <a:schemeClr val="lt1"/>
+                </a:fontRef>
+              </p:style>
+              <p:txBody>
+                <a:bodyPr rtlCol="0" anchor="ctr"/>
+                <a:lstStyle/>
+                <a:p>
+                  <a:pPr algn="ctr"/>
+                  <a:r>
+                    <a:rPr lang="en-US" altLang="zh-CN" dirty="0" smtClean="0"/>
+                    <a:t>unit</a:t>
+                  </a:r>
+                  <a:endParaRPr lang="zh-CN" altLang="en-US" dirty="0"/>
+                </a:p>
+              </p:txBody>
+            </p:sp>
+            <p:cxnSp>
+              <p:nvCxnSpPr>
+                <p:cNvPr id="69" name="直接连接符 68"/>
+                <p:cNvCxnSpPr>
+                  <a:stCxn id="63" idx="5"/>
+                  <a:endCxn id="11" idx="0"/>
+                </p:cNvCxnSpPr>
+                <p:nvPr/>
+              </p:nvCxnSpPr>
+              <p:spPr>
+                <a:xfrm>
+                  <a:off x="2280660" y="569750"/>
+                  <a:ext cx="610588" cy="699521"/>
+                </a:xfrm>
+                <a:prstGeom prst="line">
+                  <a:avLst/>
+                </a:prstGeom>
+              </p:spPr>
+              <p:style>
+                <a:lnRef idx="1">
+                  <a:schemeClr val="accent1"/>
+                </a:lnRef>
+                <a:fillRef idx="0">
+                  <a:schemeClr val="accent1"/>
+                </a:fillRef>
+                <a:effectRef idx="0">
+                  <a:schemeClr val="accent1"/>
+                </a:effectRef>
+                <a:fontRef idx="minor">
+                  <a:schemeClr val="tx1"/>
+                </a:fontRef>
+              </p:style>
+            </p:cxnSp>
+            <p:cxnSp>
+              <p:nvCxnSpPr>
+                <p:cNvPr id="76" name="直接连接符 75"/>
+                <p:cNvCxnSpPr>
+                  <a:stCxn id="11" idx="1"/>
+                  <a:endCxn id="65" idx="7"/>
+                </p:cNvCxnSpPr>
+                <p:nvPr/>
+              </p:nvCxnSpPr>
+              <p:spPr>
+                <a:xfrm flipH="1">
+                  <a:off x="1606835" y="1526175"/>
+                  <a:ext cx="674813" cy="229264"/>
+                </a:xfrm>
+                <a:prstGeom prst="line">
+                  <a:avLst/>
+                </a:prstGeom>
+              </p:spPr>
+              <p:style>
+                <a:lnRef idx="1">
+                  <a:schemeClr val="accent1"/>
+                </a:lnRef>
+                <a:fillRef idx="0">
+                  <a:schemeClr val="accent1"/>
+                </a:fillRef>
+                <a:effectRef idx="0">
+                  <a:schemeClr val="accent1"/>
+                </a:effectRef>
+                <a:fontRef idx="minor">
+                  <a:schemeClr val="tx1"/>
+                </a:fontRef>
+              </p:style>
+            </p:cxnSp>
+            <p:cxnSp>
+              <p:nvCxnSpPr>
+                <p:cNvPr id="78" name="直接连接符 77"/>
+                <p:cNvCxnSpPr>
+                  <a:stCxn id="11" idx="1"/>
+                  <a:endCxn id="64" idx="5"/>
+                </p:cNvCxnSpPr>
+                <p:nvPr/>
+              </p:nvCxnSpPr>
+              <p:spPr>
+                <a:xfrm flipH="1" flipV="1">
+                  <a:off x="1415166" y="1239223"/>
+                  <a:ext cx="866481" cy="286952"/>
+                </a:xfrm>
+                <a:prstGeom prst="line">
+                  <a:avLst/>
+                </a:prstGeom>
+              </p:spPr>
+              <p:style>
+                <a:lnRef idx="1">
+                  <a:schemeClr val="accent1"/>
+                </a:lnRef>
+                <a:fillRef idx="0">
+                  <a:schemeClr val="accent1"/>
+                </a:fillRef>
+                <a:effectRef idx="0">
+                  <a:schemeClr val="accent1"/>
+                </a:effectRef>
+                <a:fontRef idx="minor">
+                  <a:schemeClr val="tx1"/>
+                </a:fontRef>
+              </p:style>
+            </p:cxnSp>
+            <p:cxnSp>
+              <p:nvCxnSpPr>
+                <p:cNvPr id="80" name="直接连接符 79"/>
+                <p:cNvCxnSpPr>
+                  <a:stCxn id="66" idx="4"/>
+                  <a:endCxn id="11" idx="3"/>
+                </p:cNvCxnSpPr>
+                <p:nvPr/>
+              </p:nvCxnSpPr>
+              <p:spPr>
+                <a:xfrm flipH="1">
+                  <a:off x="3500847" y="689902"/>
+                  <a:ext cx="321127" cy="836273"/>
+                </a:xfrm>
+                <a:prstGeom prst="line">
+                  <a:avLst/>
+                </a:prstGeom>
+              </p:spPr>
+              <p:style>
+                <a:lnRef idx="1">
+                  <a:schemeClr val="accent1"/>
+                </a:lnRef>
+                <a:fillRef idx="0">
+                  <a:schemeClr val="accent1"/>
+                </a:fillRef>
+                <a:effectRef idx="0">
+                  <a:schemeClr val="accent1"/>
+                </a:effectRef>
+                <a:fontRef idx="minor">
+                  <a:schemeClr val="tx1"/>
+                </a:fontRef>
+              </p:style>
+            </p:cxnSp>
+            <p:cxnSp>
+              <p:nvCxnSpPr>
+                <p:cNvPr id="82" name="直接连接符 81"/>
+                <p:cNvCxnSpPr>
+                  <a:stCxn id="67" idx="2"/>
+                  <a:endCxn id="11" idx="3"/>
+                </p:cNvCxnSpPr>
+                <p:nvPr/>
+              </p:nvCxnSpPr>
+              <p:spPr>
+                <a:xfrm flipH="1" flipV="1">
+                  <a:off x="3500847" y="1526175"/>
+                  <a:ext cx="782236" cy="229264"/>
+                </a:xfrm>
+                <a:prstGeom prst="line">
+                  <a:avLst/>
+                </a:prstGeom>
+              </p:spPr>
+              <p:style>
+                <a:lnRef idx="1">
+                  <a:schemeClr val="accent1"/>
+                </a:lnRef>
+                <a:fillRef idx="0">
+                  <a:schemeClr val="accent1"/>
+                </a:fillRef>
+                <a:effectRef idx="0">
+                  <a:schemeClr val="accent1"/>
+                </a:effectRef>
+                <a:fontRef idx="minor">
+                  <a:schemeClr val="tx1"/>
+                </a:fontRef>
+              </p:style>
+            </p:cxnSp>
+          </p:grpSp>
           <p:sp>
             <p:nvSpPr>
-              <p:cNvPr id="11" name="圆角矩形 10"/>
+              <p:cNvPr id="77" name="椭圆 76"/>
               <p:cNvSpPr/>
               <p:nvPr/>
             </p:nvSpPr>
             <p:spPr>
               <a:xfrm>
-                <a:off x="2281647" y="1269272"/>
-                <a:ext cx="1219200" cy="513805"/>
+                <a:off x="4006623" y="560613"/>
+                <a:ext cx="1762402" cy="314834"/>
               </a:xfrm>
-              <a:prstGeom prst="roundRect">
+              <a:prstGeom prst="ellipse">
                 <a:avLst/>
               </a:prstGeom>
             </p:spPr>
@@ -5244,227 +5353,7 @@
                 <a:pPr algn="ctr"/>
                 <a:r>
                   <a:rPr lang="en-US" altLang="zh-CN" dirty="0" smtClean="0"/>
-                  <a:t>Ingredient</a:t>
-                </a:r>
-                <a:endParaRPr lang="zh-CN" altLang="en-US" dirty="0"/>
-              </a:p>
-            </p:txBody>
-          </p:sp>
-          <p:sp>
-            <p:nvSpPr>
-              <p:cNvPr id="63" name="椭圆 62"/>
-              <p:cNvSpPr/>
-              <p:nvPr/>
-            </p:nvSpPr>
-            <p:spPr>
-              <a:xfrm>
-                <a:off x="599921" y="191589"/>
-                <a:ext cx="1969108" cy="443043"/>
-              </a:xfrm>
-              <a:prstGeom prst="ellipse">
-                <a:avLst/>
-              </a:prstGeom>
-            </p:spPr>
-            <p:style>
-              <a:lnRef idx="2">
-                <a:schemeClr val="accent1">
-                  <a:shade val="50000"/>
-                </a:schemeClr>
-              </a:lnRef>
-              <a:fillRef idx="1">
-                <a:schemeClr val="accent1"/>
-              </a:fillRef>
-              <a:effectRef idx="0">
-                <a:schemeClr val="accent1"/>
-              </a:effectRef>
-              <a:fontRef idx="minor">
-                <a:schemeClr val="lt1"/>
-              </a:fontRef>
-            </p:style>
-            <p:txBody>
-              <a:bodyPr rtlCol="0" anchor="ctr"/>
-              <a:lstStyle/>
-              <a:p>
-                <a:pPr algn="ctr"/>
-                <a:r>
-                  <a:rPr lang="en-US" altLang="zh-CN" dirty="0" smtClean="0"/>
-                  <a:t>ingredientID</a:t>
-                </a:r>
-                <a:endParaRPr lang="zh-CN" altLang="en-US" dirty="0"/>
-              </a:p>
-            </p:txBody>
-          </p:sp>
-          <p:sp>
-            <p:nvSpPr>
-              <p:cNvPr id="64" name="椭圆 63"/>
-              <p:cNvSpPr/>
-              <p:nvPr/>
-            </p:nvSpPr>
-            <p:spPr>
-              <a:xfrm>
-                <a:off x="311331" y="861062"/>
-                <a:ext cx="1293224" cy="443043"/>
-              </a:xfrm>
-              <a:prstGeom prst="ellipse">
-                <a:avLst/>
-              </a:prstGeom>
-            </p:spPr>
-            <p:style>
-              <a:lnRef idx="2">
-                <a:schemeClr val="accent1">
-                  <a:shade val="50000"/>
-                </a:schemeClr>
-              </a:lnRef>
-              <a:fillRef idx="1">
-                <a:schemeClr val="accent1"/>
-              </a:fillRef>
-              <a:effectRef idx="0">
-                <a:schemeClr val="accent1"/>
-              </a:effectRef>
-              <a:fontRef idx="minor">
-                <a:schemeClr val="lt1"/>
-              </a:fontRef>
-            </p:style>
-            <p:txBody>
-              <a:bodyPr rtlCol="0" anchor="ctr"/>
-              <a:lstStyle/>
-              <a:p>
-                <a:pPr algn="ctr"/>
-                <a:r>
-                  <a:rPr lang="en-US" altLang="zh-CN" dirty="0" smtClean="0"/>
-                  <a:t>name</a:t>
-                </a:r>
-                <a:endParaRPr lang="zh-CN" altLang="en-US" dirty="0"/>
-              </a:p>
-            </p:txBody>
-          </p:sp>
-          <p:sp>
-            <p:nvSpPr>
-              <p:cNvPr id="65" name="椭圆 64"/>
-              <p:cNvSpPr/>
-              <p:nvPr/>
-            </p:nvSpPr>
-            <p:spPr>
-              <a:xfrm>
-                <a:off x="291738" y="1690557"/>
-                <a:ext cx="1540732" cy="443043"/>
-              </a:xfrm>
-              <a:prstGeom prst="ellipse">
-                <a:avLst/>
-              </a:prstGeom>
-            </p:spPr>
-            <p:style>
-              <a:lnRef idx="2">
-                <a:schemeClr val="accent1">
-                  <a:shade val="50000"/>
-                </a:schemeClr>
-              </a:lnRef>
-              <a:fillRef idx="1">
-                <a:schemeClr val="accent1"/>
-              </a:fillRef>
-              <a:effectRef idx="0">
-                <a:schemeClr val="accent1"/>
-              </a:effectRef>
-              <a:fontRef idx="minor">
-                <a:schemeClr val="lt1"/>
-              </a:fontRef>
-            </p:style>
-            <p:txBody>
-              <a:bodyPr rtlCol="0" anchor="ctr"/>
-              <a:lstStyle/>
-              <a:p>
-                <a:pPr algn="ctr"/>
-                <a:r>
-                  <a:rPr lang="en-US" altLang="zh-CN" dirty="0" smtClean="0"/>
-                  <a:t>Recipe ID</a:t>
-                </a:r>
-                <a:endParaRPr lang="zh-CN" altLang="en-US" dirty="0"/>
-              </a:p>
-            </p:txBody>
-          </p:sp>
-          <p:sp>
-            <p:nvSpPr>
-              <p:cNvPr id="66" name="椭圆 65"/>
-              <p:cNvSpPr/>
-              <p:nvPr/>
-            </p:nvSpPr>
-            <p:spPr>
-              <a:xfrm>
-                <a:off x="3126376" y="246859"/>
-                <a:ext cx="1391197" cy="443043"/>
-              </a:xfrm>
-              <a:prstGeom prst="ellipse">
-                <a:avLst/>
-              </a:prstGeom>
-            </p:spPr>
-            <p:style>
-              <a:lnRef idx="2">
-                <a:schemeClr val="accent1">
-                  <a:shade val="50000"/>
-                </a:schemeClr>
-              </a:lnRef>
-              <a:fillRef idx="1">
-                <a:schemeClr val="accent1"/>
-              </a:fillRef>
-              <a:effectRef idx="0">
-                <a:schemeClr val="accent1"/>
-              </a:effectRef>
-              <a:fontRef idx="minor">
-                <a:schemeClr val="lt1"/>
-              </a:fontRef>
-            </p:style>
-            <p:txBody>
-              <a:bodyPr rtlCol="0" anchor="ctr"/>
-              <a:lstStyle/>
-              <a:p>
-                <a:pPr algn="ctr"/>
-                <a:r>
-                  <a:rPr lang="en-US" altLang="zh-CN" dirty="0" smtClean="0"/>
-                  <a:t>quantity</a:t>
-                </a:r>
-                <a:endParaRPr lang="zh-CN" altLang="en-US" dirty="0"/>
-              </a:p>
-            </p:txBody>
-          </p:sp>
-          <p:sp>
-            <p:nvSpPr>
-              <p:cNvPr id="67" name="椭圆 66"/>
-              <p:cNvSpPr/>
-              <p:nvPr/>
-            </p:nvSpPr>
-            <p:spPr>
-              <a:xfrm>
-                <a:off x="4283083" y="1533917"/>
-                <a:ext cx="1391197" cy="443043"/>
-              </a:xfrm>
-              <a:prstGeom prst="ellipse">
-                <a:avLst/>
-              </a:prstGeom>
-            </p:spPr>
-            <p:style>
-              <a:lnRef idx="2">
-                <a:schemeClr val="accent1">
-                  <a:shade val="50000"/>
-                </a:schemeClr>
-              </a:lnRef>
-              <a:fillRef idx="1">
-                <a:schemeClr val="accent1"/>
-              </a:fillRef>
-              <a:effectRef idx="0">
-                <a:schemeClr val="accent1"/>
-              </a:effectRef>
-              <a:fontRef idx="minor">
-                <a:schemeClr val="lt1"/>
-              </a:fontRef>
-            </p:style>
-            <p:txBody>
-              <a:bodyPr rtlCol="0" anchor="ctr"/>
-              <a:lstStyle/>
-              <a:p>
-                <a:pPr algn="ctr"/>
-                <a:r>
-                  <a:rPr lang="en-US" altLang="zh-CN" dirty="0" smtClean="0"/>
-                  <a:t>unit</a:t>
+                  <a:t>comments</a:t>
                 </a:r>
                 <a:endParaRPr lang="zh-CN" altLang="en-US" dirty="0"/>
               </a:p>
@@ -5472,149 +5361,17 @@
           </p:sp>
           <p:cxnSp>
             <p:nvCxnSpPr>
-              <p:cNvPr id="69" name="直接连接符 68"/>
+              <p:cNvPr id="79" name="直接连接符 78"/>
               <p:cNvCxnSpPr>
-                <a:stCxn id="63" idx="5"/>
-                <a:endCxn id="11" idx="0"/>
-              </p:cNvCxnSpPr>
-              <p:nvPr/>
-            </p:nvCxnSpPr>
-            <p:spPr>
-              <a:xfrm>
-                <a:off x="2280660" y="569750"/>
-                <a:ext cx="610588" cy="699521"/>
-              </a:xfrm>
-              <a:prstGeom prst="line">
-                <a:avLst/>
-              </a:prstGeom>
-            </p:spPr>
-            <p:style>
-              <a:lnRef idx="1">
-                <a:schemeClr val="accent1"/>
-              </a:lnRef>
-              <a:fillRef idx="0">
-                <a:schemeClr val="accent1"/>
-              </a:fillRef>
-              <a:effectRef idx="0">
-                <a:schemeClr val="accent1"/>
-              </a:effectRef>
-              <a:fontRef idx="minor">
-                <a:schemeClr val="tx1"/>
-              </a:fontRef>
-            </p:style>
-          </p:cxnSp>
-          <p:cxnSp>
-            <p:nvCxnSpPr>
-              <p:cNvPr id="76" name="直接连接符 75"/>
-              <p:cNvCxnSpPr>
-                <a:stCxn id="11" idx="1"/>
-                <a:endCxn id="65" idx="7"/>
-              </p:cNvCxnSpPr>
-              <p:nvPr/>
-            </p:nvCxnSpPr>
-            <p:spPr>
-              <a:xfrm flipH="1">
-                <a:off x="1606835" y="1526175"/>
-                <a:ext cx="674813" cy="229264"/>
-              </a:xfrm>
-              <a:prstGeom prst="line">
-                <a:avLst/>
-              </a:prstGeom>
-            </p:spPr>
-            <p:style>
-              <a:lnRef idx="1">
-                <a:schemeClr val="accent1"/>
-              </a:lnRef>
-              <a:fillRef idx="0">
-                <a:schemeClr val="accent1"/>
-              </a:fillRef>
-              <a:effectRef idx="0">
-                <a:schemeClr val="accent1"/>
-              </a:effectRef>
-              <a:fontRef idx="minor">
-                <a:schemeClr val="tx1"/>
-              </a:fontRef>
-            </p:style>
-          </p:cxnSp>
-          <p:cxnSp>
-            <p:nvCxnSpPr>
-              <p:cNvPr id="78" name="直接连接符 77"/>
-              <p:cNvCxnSpPr>
-                <a:stCxn id="11" idx="1"/>
-                <a:endCxn id="64" idx="5"/>
-              </p:cNvCxnSpPr>
-              <p:nvPr/>
-            </p:nvCxnSpPr>
-            <p:spPr>
-              <a:xfrm flipH="1" flipV="1">
-                <a:off x="1415166" y="1239223"/>
-                <a:ext cx="866481" cy="286952"/>
-              </a:xfrm>
-              <a:prstGeom prst="line">
-                <a:avLst/>
-              </a:prstGeom>
-            </p:spPr>
-            <p:style>
-              <a:lnRef idx="1">
-                <a:schemeClr val="accent1"/>
-              </a:lnRef>
-              <a:fillRef idx="0">
-                <a:schemeClr val="accent1"/>
-              </a:fillRef>
-              <a:effectRef idx="0">
-                <a:schemeClr val="accent1"/>
-              </a:effectRef>
-              <a:fontRef idx="minor">
-                <a:schemeClr val="tx1"/>
-              </a:fontRef>
-            </p:style>
-          </p:cxnSp>
-          <p:cxnSp>
-            <p:nvCxnSpPr>
-              <p:cNvPr id="80" name="直接连接符 79"/>
-              <p:cNvCxnSpPr>
-                <a:stCxn id="66" idx="4"/>
+                <a:stCxn id="77" idx="2"/>
                 <a:endCxn id="11" idx="3"/>
               </p:cNvCxnSpPr>
               <p:nvPr/>
             </p:nvCxnSpPr>
             <p:spPr>
               <a:xfrm flipH="1">
-                <a:off x="3500847" y="689902"/>
-                <a:ext cx="321127" cy="836273"/>
-              </a:xfrm>
-              <a:prstGeom prst="line">
-                <a:avLst/>
-              </a:prstGeom>
-            </p:spPr>
-            <p:style>
-              <a:lnRef idx="1">
-                <a:schemeClr val="accent1"/>
-              </a:lnRef>
-              <a:fillRef idx="0">
-                <a:schemeClr val="accent1"/>
-              </a:fillRef>
-              <a:effectRef idx="0">
-                <a:schemeClr val="accent1"/>
-              </a:effectRef>
-              <a:fontRef idx="minor">
-                <a:schemeClr val="tx1"/>
-              </a:fontRef>
-            </p:style>
-          </p:cxnSp>
-          <p:cxnSp>
-            <p:nvCxnSpPr>
-              <p:cNvPr id="82" name="直接连接符 81"/>
-              <p:cNvCxnSpPr>
-                <a:stCxn id="67" idx="2"/>
-                <a:endCxn id="11" idx="3"/>
-              </p:cNvCxnSpPr>
-              <p:nvPr/>
-            </p:nvCxnSpPr>
-            <p:spPr>
-              <a:xfrm flipH="1" flipV="1">
-                <a:off x="3500847" y="1526175"/>
-                <a:ext cx="782236" cy="229264"/>
+                <a:off x="3173873" y="718030"/>
+                <a:ext cx="832750" cy="421939"/>
               </a:xfrm>
               <a:prstGeom prst="line">
                 <a:avLst/>
@@ -5638,14 +5395,14 @@
         </p:grpSp>
         <p:sp>
           <p:nvSpPr>
-            <p:cNvPr id="77" name="椭圆 76"/>
+            <p:cNvPr id="81" name="椭圆 80"/>
             <p:cNvSpPr/>
             <p:nvPr/>
           </p:nvSpPr>
           <p:spPr>
             <a:xfrm>
-              <a:off x="4006623" y="560613"/>
-              <a:ext cx="1762402" cy="314834"/>
+              <a:off x="98616" y="1819276"/>
+              <a:ext cx="1523815" cy="314834"/>
             </a:xfrm>
             <a:prstGeom prst="ellipse">
               <a:avLst/>
@@ -5674,7 +5431,7 @@
               <a:pPr algn="ctr"/>
               <a:r>
                 <a:rPr lang="en-US" altLang="zh-CN" dirty="0" smtClean="0"/>
-                <a:t>comments</a:t>
+                <a:t>Status</a:t>
               </a:r>
               <a:endParaRPr lang="zh-CN" altLang="en-US" dirty="0"/>
             </a:p>
@@ -5682,17 +5439,481 @@
         </p:sp>
         <p:cxnSp>
           <p:nvCxnSpPr>
-            <p:cNvPr id="79" name="直接连接符 78"/>
+            <p:cNvPr id="83" name="直接连接符 82"/>
             <p:cNvCxnSpPr>
-              <a:stCxn id="77" idx="2"/>
-              <a:endCxn id="11" idx="3"/>
+              <a:stCxn id="11" idx="1"/>
+              <a:endCxn id="81" idx="7"/>
             </p:cNvCxnSpPr>
             <p:nvPr/>
           </p:nvCxnSpPr>
           <p:spPr>
             <a:xfrm flipH="1">
-              <a:off x="3173873" y="718030"/>
-              <a:ext cx="832750" cy="421939"/>
+              <a:off x="1399273" y="1139969"/>
+              <a:ext cx="568787" cy="725413"/>
+            </a:xfrm>
+            <a:prstGeom prst="line">
+              <a:avLst/>
+            </a:prstGeom>
+          </p:spPr>
+          <p:style>
+            <a:lnRef idx="1">
+              <a:schemeClr val="accent1"/>
+            </a:lnRef>
+            <a:fillRef idx="0">
+              <a:schemeClr val="accent1"/>
+            </a:fillRef>
+            <a:effectRef idx="0">
+              <a:schemeClr val="accent1"/>
+            </a:effectRef>
+            <a:fontRef idx="minor">
+              <a:schemeClr val="tx1"/>
+            </a:fontRef>
+          </p:style>
+        </p:cxnSp>
+      </p:grpSp>
+      <p:grpSp>
+        <p:nvGrpSpPr>
+          <p:cNvPr id="22" name="组合 21"/>
+          <p:cNvGrpSpPr/>
+          <p:nvPr/>
+        </p:nvGrpSpPr>
+        <p:grpSpPr>
+          <a:xfrm>
+            <a:off x="8416836" y="3082834"/>
+            <a:ext cx="3394164" cy="3175043"/>
+            <a:chOff x="8416836" y="3082834"/>
+            <a:chExt cx="3394164" cy="3175043"/>
+          </a:xfrm>
+        </p:grpSpPr>
+        <p:grpSp>
+          <p:nvGrpSpPr>
+            <p:cNvPr id="97" name="组合 96"/>
+            <p:cNvGrpSpPr/>
+            <p:nvPr/>
+          </p:nvGrpSpPr>
+          <p:grpSpPr>
+            <a:xfrm>
+              <a:off x="8416836" y="3869376"/>
+              <a:ext cx="3394164" cy="2388501"/>
+              <a:chOff x="8416836" y="3869376"/>
+              <a:chExt cx="3394164" cy="2388501"/>
+            </a:xfrm>
+          </p:grpSpPr>
+          <p:sp>
+            <p:nvSpPr>
+              <p:cNvPr id="9" name="圆角矩形 8"/>
+              <p:cNvSpPr/>
+              <p:nvPr/>
+            </p:nvSpPr>
+            <p:spPr>
+              <a:xfrm>
+                <a:off x="8643255" y="4659084"/>
+                <a:ext cx="1219200" cy="513805"/>
+              </a:xfrm>
+              <a:prstGeom prst="roundRect">
+                <a:avLst/>
+              </a:prstGeom>
+              <a:solidFill>
+                <a:schemeClr val="bg2">
+                  <a:lumMod val="25000"/>
+                </a:schemeClr>
+              </a:solidFill>
+            </p:spPr>
+            <p:style>
+              <a:lnRef idx="2">
+                <a:schemeClr val="accent1">
+                  <a:shade val="50000"/>
+                </a:schemeClr>
+              </a:lnRef>
+              <a:fillRef idx="1">
+                <a:schemeClr val="accent1"/>
+              </a:fillRef>
+              <a:effectRef idx="0">
+                <a:schemeClr val="accent1"/>
+              </a:effectRef>
+              <a:fontRef idx="minor">
+                <a:schemeClr val="lt1"/>
+              </a:fontRef>
+            </p:style>
+            <p:txBody>
+              <a:bodyPr rtlCol="0" anchor="ctr"/>
+              <a:lstStyle/>
+              <a:p>
+                <a:pPr algn="ctr"/>
+                <a:r>
+                  <a:rPr lang="en-US" altLang="zh-CN" dirty="0" smtClean="0"/>
+                  <a:t>Step</a:t>
+                </a:r>
+                <a:endParaRPr lang="zh-CN" altLang="en-US" dirty="0"/>
+              </a:p>
+            </p:txBody>
+          </p:sp>
+          <p:sp>
+            <p:nvSpPr>
+              <p:cNvPr id="85" name="椭圆 84"/>
+              <p:cNvSpPr/>
+              <p:nvPr/>
+            </p:nvSpPr>
+            <p:spPr>
+              <a:xfrm>
+                <a:off x="10417628" y="3869376"/>
+                <a:ext cx="1293224" cy="443043"/>
+              </a:xfrm>
+              <a:prstGeom prst="ellipse">
+                <a:avLst/>
+              </a:prstGeom>
+            </p:spPr>
+            <p:style>
+              <a:lnRef idx="2">
+                <a:schemeClr val="accent1">
+                  <a:shade val="50000"/>
+                </a:schemeClr>
+              </a:lnRef>
+              <a:fillRef idx="1">
+                <a:schemeClr val="accent1"/>
+              </a:fillRef>
+              <a:effectRef idx="0">
+                <a:schemeClr val="accent1"/>
+              </a:effectRef>
+              <a:fontRef idx="minor">
+                <a:schemeClr val="lt1"/>
+              </a:fontRef>
+            </p:style>
+            <p:txBody>
+              <a:bodyPr rtlCol="0" anchor="ctr"/>
+              <a:lstStyle/>
+              <a:p>
+                <a:pPr algn="ctr"/>
+                <a:r>
+                  <a:rPr lang="en-US" altLang="zh-CN" dirty="0" smtClean="0"/>
+                  <a:t>stepID</a:t>
+                </a:r>
+                <a:endParaRPr lang="zh-CN" altLang="en-US" dirty="0"/>
+              </a:p>
+            </p:txBody>
+          </p:sp>
+          <p:sp>
+            <p:nvSpPr>
+              <p:cNvPr id="86" name="椭圆 85"/>
+              <p:cNvSpPr/>
+              <p:nvPr/>
+            </p:nvSpPr>
+            <p:spPr>
+              <a:xfrm>
+                <a:off x="10517776" y="4843498"/>
+                <a:ext cx="1293224" cy="443043"/>
+              </a:xfrm>
+              <a:prstGeom prst="ellipse">
+                <a:avLst/>
+              </a:prstGeom>
+            </p:spPr>
+            <p:style>
+              <a:lnRef idx="2">
+                <a:schemeClr val="accent1">
+                  <a:shade val="50000"/>
+                </a:schemeClr>
+              </a:lnRef>
+              <a:fillRef idx="1">
+                <a:schemeClr val="accent1"/>
+              </a:fillRef>
+              <a:effectRef idx="0">
+                <a:schemeClr val="accent1"/>
+              </a:effectRef>
+              <a:fontRef idx="minor">
+                <a:schemeClr val="lt1"/>
+              </a:fontRef>
+            </p:style>
+            <p:txBody>
+              <a:bodyPr rtlCol="0" anchor="ctr"/>
+              <a:lstStyle/>
+              <a:p>
+                <a:pPr algn="ctr"/>
+                <a:r>
+                  <a:rPr lang="en-US" altLang="zh-CN" dirty="0" smtClean="0"/>
+                  <a:t>content</a:t>
+                </a:r>
+                <a:endParaRPr lang="zh-CN" altLang="en-US" dirty="0"/>
+              </a:p>
+            </p:txBody>
+          </p:sp>
+          <p:sp>
+            <p:nvSpPr>
+              <p:cNvPr id="87" name="椭圆 86"/>
+              <p:cNvSpPr/>
+              <p:nvPr/>
+            </p:nvSpPr>
+            <p:spPr>
+              <a:xfrm>
+                <a:off x="9989819" y="5814834"/>
+                <a:ext cx="1687288" cy="443043"/>
+              </a:xfrm>
+              <a:prstGeom prst="ellipse">
+                <a:avLst/>
+              </a:prstGeom>
+            </p:spPr>
+            <p:style>
+              <a:lnRef idx="2">
+                <a:schemeClr val="accent1">
+                  <a:shade val="50000"/>
+                </a:schemeClr>
+              </a:lnRef>
+              <a:fillRef idx="1">
+                <a:schemeClr val="accent1"/>
+              </a:fillRef>
+              <a:effectRef idx="0">
+                <a:schemeClr val="accent1"/>
+              </a:effectRef>
+              <a:fontRef idx="minor">
+                <a:schemeClr val="lt1"/>
+              </a:fontRef>
+            </p:style>
+            <p:txBody>
+              <a:bodyPr rtlCol="0" anchor="ctr"/>
+              <a:lstStyle/>
+              <a:p>
+                <a:pPr algn="ctr"/>
+                <a:r>
+                  <a:rPr lang="en-US" altLang="zh-CN" dirty="0" smtClean="0"/>
+                  <a:t>recipeID</a:t>
+                </a:r>
+                <a:endParaRPr lang="zh-CN" altLang="en-US" dirty="0"/>
+              </a:p>
+            </p:txBody>
+          </p:sp>
+          <p:sp>
+            <p:nvSpPr>
+              <p:cNvPr id="88" name="椭圆 87"/>
+              <p:cNvSpPr/>
+              <p:nvPr/>
+            </p:nvSpPr>
+            <p:spPr>
+              <a:xfrm>
+                <a:off x="8416836" y="5814833"/>
+                <a:ext cx="1293224" cy="443043"/>
+              </a:xfrm>
+              <a:prstGeom prst="ellipse">
+                <a:avLst/>
+              </a:prstGeom>
+            </p:spPr>
+            <p:style>
+              <a:lnRef idx="2">
+                <a:schemeClr val="accent1">
+                  <a:shade val="50000"/>
+                </a:schemeClr>
+              </a:lnRef>
+              <a:fillRef idx="1">
+                <a:schemeClr val="accent1"/>
+              </a:fillRef>
+              <a:effectRef idx="0">
+                <a:schemeClr val="accent1"/>
+              </a:effectRef>
+              <a:fontRef idx="minor">
+                <a:schemeClr val="lt1"/>
+              </a:fontRef>
+            </p:style>
+            <p:txBody>
+              <a:bodyPr rtlCol="0" anchor="ctr"/>
+              <a:lstStyle/>
+              <a:p>
+                <a:pPr algn="ctr"/>
+                <a:r>
+                  <a:rPr lang="en-US" altLang="zh-CN" dirty="0" smtClean="0"/>
+                  <a:t>order</a:t>
+                </a:r>
+                <a:endParaRPr lang="zh-CN" altLang="en-US" dirty="0"/>
+              </a:p>
+            </p:txBody>
+          </p:sp>
+          <p:cxnSp>
+            <p:nvCxnSpPr>
+              <p:cNvPr id="90" name="直接连接符 89"/>
+              <p:cNvCxnSpPr>
+                <a:stCxn id="9" idx="2"/>
+                <a:endCxn id="87" idx="0"/>
+              </p:cNvCxnSpPr>
+              <p:nvPr/>
+            </p:nvCxnSpPr>
+            <p:spPr>
+              <a:xfrm>
+                <a:off x="9252855" y="5172889"/>
+                <a:ext cx="1580608" cy="641945"/>
+              </a:xfrm>
+              <a:prstGeom prst="line">
+                <a:avLst/>
+              </a:prstGeom>
+            </p:spPr>
+            <p:style>
+              <a:lnRef idx="1">
+                <a:schemeClr val="accent1"/>
+              </a:lnRef>
+              <a:fillRef idx="0">
+                <a:schemeClr val="accent1"/>
+              </a:fillRef>
+              <a:effectRef idx="0">
+                <a:schemeClr val="accent1"/>
+              </a:effectRef>
+              <a:fontRef idx="minor">
+                <a:schemeClr val="tx1"/>
+              </a:fontRef>
+            </p:style>
+          </p:cxnSp>
+          <p:cxnSp>
+            <p:nvCxnSpPr>
+              <p:cNvPr id="91" name="直接连接符 90"/>
+              <p:cNvCxnSpPr>
+                <a:stCxn id="9" idx="2"/>
+                <a:endCxn id="88" idx="0"/>
+              </p:cNvCxnSpPr>
+              <p:nvPr/>
+            </p:nvCxnSpPr>
+            <p:spPr>
+              <a:xfrm flipH="1">
+                <a:off x="9063448" y="5172889"/>
+                <a:ext cx="189407" cy="641944"/>
+              </a:xfrm>
+              <a:prstGeom prst="line">
+                <a:avLst/>
+              </a:prstGeom>
+            </p:spPr>
+            <p:style>
+              <a:lnRef idx="1">
+                <a:schemeClr val="accent1"/>
+              </a:lnRef>
+              <a:fillRef idx="0">
+                <a:schemeClr val="accent1"/>
+              </a:fillRef>
+              <a:effectRef idx="0">
+                <a:schemeClr val="accent1"/>
+              </a:effectRef>
+              <a:fontRef idx="minor">
+                <a:schemeClr val="tx1"/>
+              </a:fontRef>
+            </p:style>
+          </p:cxnSp>
+          <p:cxnSp>
+            <p:nvCxnSpPr>
+              <p:cNvPr id="93" name="直接连接符 92"/>
+              <p:cNvCxnSpPr>
+                <a:stCxn id="9" idx="0"/>
+                <a:endCxn id="85" idx="3"/>
+              </p:cNvCxnSpPr>
+              <p:nvPr/>
+            </p:nvCxnSpPr>
+            <p:spPr>
+              <a:xfrm flipV="1">
+                <a:off x="9252855" y="4247537"/>
+                <a:ext cx="1354161" cy="411547"/>
+              </a:xfrm>
+              <a:prstGeom prst="line">
+                <a:avLst/>
+              </a:prstGeom>
+            </p:spPr>
+            <p:style>
+              <a:lnRef idx="1">
+                <a:schemeClr val="accent1"/>
+              </a:lnRef>
+              <a:fillRef idx="0">
+                <a:schemeClr val="accent1"/>
+              </a:fillRef>
+              <a:effectRef idx="0">
+                <a:schemeClr val="accent1"/>
+              </a:effectRef>
+              <a:fontRef idx="minor">
+                <a:schemeClr val="tx1"/>
+              </a:fontRef>
+            </p:style>
+          </p:cxnSp>
+          <p:cxnSp>
+            <p:nvCxnSpPr>
+              <p:cNvPr id="95" name="直接连接符 94"/>
+              <p:cNvCxnSpPr>
+                <a:stCxn id="9" idx="3"/>
+                <a:endCxn id="86" idx="2"/>
+              </p:cNvCxnSpPr>
+              <p:nvPr/>
+            </p:nvCxnSpPr>
+            <p:spPr>
+              <a:xfrm>
+                <a:off x="9862455" y="4915987"/>
+                <a:ext cx="655321" cy="149033"/>
+              </a:xfrm>
+              <a:prstGeom prst="line">
+                <a:avLst/>
+              </a:prstGeom>
+            </p:spPr>
+            <p:style>
+              <a:lnRef idx="1">
+                <a:schemeClr val="accent1"/>
+              </a:lnRef>
+              <a:fillRef idx="0">
+                <a:schemeClr val="accent1"/>
+              </a:fillRef>
+              <a:effectRef idx="0">
+                <a:schemeClr val="accent1"/>
+              </a:effectRef>
+              <a:fontRef idx="minor">
+                <a:schemeClr val="tx1"/>
+              </a:fontRef>
+            </p:style>
+          </p:cxnSp>
+        </p:grpSp>
+        <p:sp>
+          <p:nvSpPr>
+            <p:cNvPr id="89" name="椭圆 88"/>
+            <p:cNvSpPr/>
+            <p:nvPr/>
+          </p:nvSpPr>
+          <p:spPr>
+            <a:xfrm>
+              <a:off x="10278866" y="3082834"/>
+              <a:ext cx="1523815" cy="430154"/>
+            </a:xfrm>
+            <a:prstGeom prst="ellipse">
+              <a:avLst/>
+            </a:prstGeom>
+          </p:spPr>
+          <p:style>
+            <a:lnRef idx="2">
+              <a:schemeClr val="accent1">
+                <a:shade val="50000"/>
+              </a:schemeClr>
+            </a:lnRef>
+            <a:fillRef idx="1">
+              <a:schemeClr val="accent1"/>
+            </a:fillRef>
+            <a:effectRef idx="0">
+              <a:schemeClr val="accent1"/>
+            </a:effectRef>
+            <a:fontRef idx="minor">
+              <a:schemeClr val="lt1"/>
+            </a:fontRef>
+          </p:style>
+          <p:txBody>
+            <a:bodyPr rtlCol="0" anchor="ctr"/>
+            <a:lstStyle/>
+            <a:p>
+              <a:pPr algn="ctr"/>
+              <a:r>
+                <a:rPr lang="en-US" altLang="zh-CN" dirty="0" smtClean="0"/>
+                <a:t>Status</a:t>
+              </a:r>
+              <a:endParaRPr lang="zh-CN" altLang="en-US" dirty="0"/>
+            </a:p>
+          </p:txBody>
+        </p:sp>
+        <p:cxnSp>
+          <p:nvCxnSpPr>
+            <p:cNvPr id="7" name="直接连接符 6"/>
+            <p:cNvCxnSpPr>
+              <a:stCxn id="89" idx="2"/>
+              <a:endCxn id="9" idx="0"/>
+            </p:cNvCxnSpPr>
+            <p:nvPr/>
+          </p:nvCxnSpPr>
+          <p:spPr>
+            <a:xfrm flipH="1">
+              <a:off x="9252855" y="3297911"/>
+              <a:ext cx="1026011" cy="1361173"/>
             </a:xfrm>
             <a:prstGeom prst="line">
               <a:avLst/>

</xml_diff>